<commit_message>
Handled Issue 412 [DevMan: Add association links among Storage::entity classes] Update Issue 412 Updated the relevant pptx file and png file.
</commit_message>
<xml_diff>
--- a/doc/diagrams/StorageComponent.pptx
+++ b/doc/diagrams/StorageComponent.pptx
@@ -193,7 +193,7 @@
             <a:fld id="{AF301891-4E62-472A-98E9-95DBD40531A4}" type="datetimeFigureOut">
               <a:rPr lang="en-SG" smtClean="0"/>
               <a:pPr/>
-              <a:t>27/10/12</a:t>
+              <a:t>3/12/2012</a:t>
             </a:fld>
             <a:endParaRPr lang="en-SG"/>
           </a:p>
@@ -729,7 +729,7 @@
             <a:fld id="{1D8BD707-D9CF-40AE-B4C6-C98DA3205C09}" type="datetimeFigureOut">
               <a:rPr lang="en-US" smtClean="0"/>
               <a:pPr/>
-              <a:t>27/10/12</a:t>
+              <a:t>12/3/2012</a:t>
             </a:fld>
             <a:endParaRPr lang="en-US"/>
           </a:p>
@@ -896,7 +896,7 @@
             <a:fld id="{1D8BD707-D9CF-40AE-B4C6-C98DA3205C09}" type="datetimeFigureOut">
               <a:rPr lang="en-US" smtClean="0"/>
               <a:pPr/>
-              <a:t>27/10/12</a:t>
+              <a:t>12/3/2012</a:t>
             </a:fld>
             <a:endParaRPr lang="en-US"/>
           </a:p>
@@ -1073,7 +1073,7 @@
             <a:fld id="{1D8BD707-D9CF-40AE-B4C6-C98DA3205C09}" type="datetimeFigureOut">
               <a:rPr lang="en-US" smtClean="0"/>
               <a:pPr/>
-              <a:t>27/10/12</a:t>
+              <a:t>12/3/2012</a:t>
             </a:fld>
             <a:endParaRPr lang="en-US"/>
           </a:p>
@@ -1240,7 +1240,7 @@
             <a:fld id="{1D8BD707-D9CF-40AE-B4C6-C98DA3205C09}" type="datetimeFigureOut">
               <a:rPr lang="en-US" smtClean="0"/>
               <a:pPr/>
-              <a:t>27/10/12</a:t>
+              <a:t>12/3/2012</a:t>
             </a:fld>
             <a:endParaRPr lang="en-US"/>
           </a:p>
@@ -1483,7 +1483,7 @@
             <a:fld id="{1D8BD707-D9CF-40AE-B4C6-C98DA3205C09}" type="datetimeFigureOut">
               <a:rPr lang="en-US" smtClean="0"/>
               <a:pPr/>
-              <a:t>27/10/12</a:t>
+              <a:t>12/3/2012</a:t>
             </a:fld>
             <a:endParaRPr lang="en-US"/>
           </a:p>
@@ -1768,7 +1768,7 @@
             <a:fld id="{1D8BD707-D9CF-40AE-B4C6-C98DA3205C09}" type="datetimeFigureOut">
               <a:rPr lang="en-US" smtClean="0"/>
               <a:pPr/>
-              <a:t>27/10/12</a:t>
+              <a:t>12/3/2012</a:t>
             </a:fld>
             <a:endParaRPr lang="en-US"/>
           </a:p>
@@ -2187,7 +2187,7 @@
             <a:fld id="{1D8BD707-D9CF-40AE-B4C6-C98DA3205C09}" type="datetimeFigureOut">
               <a:rPr lang="en-US" smtClean="0"/>
               <a:pPr/>
-              <a:t>27/10/12</a:t>
+              <a:t>12/3/2012</a:t>
             </a:fld>
             <a:endParaRPr lang="en-US"/>
           </a:p>
@@ -2302,7 +2302,7 @@
             <a:fld id="{1D8BD707-D9CF-40AE-B4C6-C98DA3205C09}" type="datetimeFigureOut">
               <a:rPr lang="en-US" smtClean="0"/>
               <a:pPr/>
-              <a:t>27/10/12</a:t>
+              <a:t>12/3/2012</a:t>
             </a:fld>
             <a:endParaRPr lang="en-US"/>
           </a:p>
@@ -2394,7 +2394,7 @@
             <a:fld id="{1D8BD707-D9CF-40AE-B4C6-C98DA3205C09}" type="datetimeFigureOut">
               <a:rPr lang="en-US" smtClean="0"/>
               <a:pPr/>
-              <a:t>27/10/12</a:t>
+              <a:t>12/3/2012</a:t>
             </a:fld>
             <a:endParaRPr lang="en-US"/>
           </a:p>
@@ -2668,7 +2668,7 @@
             <a:fld id="{1D8BD707-D9CF-40AE-B4C6-C98DA3205C09}" type="datetimeFigureOut">
               <a:rPr lang="en-US" smtClean="0"/>
               <a:pPr/>
-              <a:t>27/10/12</a:t>
+              <a:t>12/3/2012</a:t>
             </a:fld>
             <a:endParaRPr lang="en-US"/>
           </a:p>
@@ -2918,7 +2918,7 @@
             <a:fld id="{1D8BD707-D9CF-40AE-B4C6-C98DA3205C09}" type="datetimeFigureOut">
               <a:rPr lang="en-US" smtClean="0"/>
               <a:pPr/>
-              <a:t>27/10/12</a:t>
+              <a:t>12/3/2012</a:t>
             </a:fld>
             <a:endParaRPr lang="en-US"/>
           </a:p>
@@ -3128,7 +3128,7 @@
             <a:fld id="{1D8BD707-D9CF-40AE-B4C6-C98DA3205C09}" type="datetimeFigureOut">
               <a:rPr lang="en-US" smtClean="0"/>
               <a:pPr/>
-              <a:t>27/10/12</a:t>
+              <a:t>12/3/2012</a:t>
             </a:fld>
             <a:endParaRPr lang="en-US"/>
           </a:p>
@@ -3507,8 +3507,8 @@
         </p:nvSpPr>
         <p:spPr>
           <a:xfrm>
-            <a:off x="1295400" y="34183"/>
-            <a:ext cx="6400800" cy="6176115"/>
+            <a:off x="1066800" y="96725"/>
+            <a:ext cx="7543800" cy="5999276"/>
           </a:xfrm>
           <a:prstGeom prst="roundRect">
             <a:avLst>
@@ -3566,8 +3566,8 @@
         </p:nvGrpSpPr>
         <p:grpSpPr>
           <a:xfrm>
-            <a:off x="2057400" y="2632816"/>
-            <a:ext cx="5410200" cy="1710584"/>
+            <a:off x="1334982" y="3184781"/>
+            <a:ext cx="7047018" cy="1221160"/>
             <a:chOff x="-4267200" y="1447800"/>
             <a:chExt cx="5410200" cy="1710584"/>
           </a:xfrm>
@@ -3713,10 +3713,10 @@
         </p:nvGrpSpPr>
         <p:grpSpPr>
           <a:xfrm>
-            <a:off x="2057400" y="343258"/>
-            <a:ext cx="5410200" cy="1866542"/>
+            <a:off x="1334982" y="405799"/>
+            <a:ext cx="7047018" cy="2476142"/>
             <a:chOff x="-4267200" y="1447800"/>
-            <a:chExt cx="5410200" cy="1866542"/>
+            <a:chExt cx="5410200" cy="2476142"/>
           </a:xfrm>
           <a:solidFill>
             <a:schemeClr val="bg1"/>
@@ -3731,7 +3731,7 @@
           <p:spPr>
             <a:xfrm>
               <a:off x="-4267200" y="1523999"/>
-              <a:ext cx="5410200" cy="1790343"/>
+              <a:ext cx="5410200" cy="2399943"/>
             </a:xfrm>
             <a:prstGeom prst="rect">
               <a:avLst/>
@@ -3850,8 +3850,8 @@
         </p:nvCxnSpPr>
         <p:spPr>
           <a:xfrm>
-            <a:off x="1042801" y="3200400"/>
-            <a:ext cx="1041563" cy="1488"/>
+            <a:off x="814201" y="3488564"/>
+            <a:ext cx="520781" cy="1488"/>
           </a:xfrm>
           <a:prstGeom prst="straightConnector1">
             <a:avLst/>
@@ -3887,8 +3887,8 @@
         </p:nvGrpSpPr>
         <p:grpSpPr>
           <a:xfrm>
-            <a:off x="2057400" y="4690216"/>
-            <a:ext cx="5410200" cy="1177184"/>
+            <a:off x="1334982" y="4752757"/>
+            <a:ext cx="7047018" cy="1177184"/>
             <a:chOff x="-4267200" y="1447800"/>
             <a:chExt cx="5410200" cy="1177184"/>
           </a:xfrm>
@@ -4034,8 +4034,8 @@
         </p:nvSpPr>
         <p:spPr>
           <a:xfrm>
-            <a:off x="2724150" y="3048000"/>
-            <a:ext cx="2000250" cy="457200"/>
+            <a:off x="3345596" y="3643941"/>
+            <a:ext cx="1452472" cy="457200"/>
           </a:xfrm>
           <a:prstGeom prst="rect">
             <a:avLst/>
@@ -4078,8 +4078,8 @@
         </p:nvSpPr>
         <p:spPr>
           <a:xfrm>
-            <a:off x="5309609" y="2981415"/>
-            <a:ext cx="1929391" cy="457200"/>
+            <a:off x="6172200" y="3643941"/>
+            <a:ext cx="1447800" cy="457200"/>
           </a:xfrm>
           <a:prstGeom prst="rect">
             <a:avLst/>
@@ -4122,7 +4122,7 @@
         </p:nvSpPr>
         <p:spPr>
           <a:xfrm>
-            <a:off x="5391150" y="5176486"/>
+            <a:off x="5162550" y="5239027"/>
             <a:ext cx="1466850" cy="386114"/>
           </a:xfrm>
           <a:prstGeom prst="rect">
@@ -4166,7 +4166,7 @@
         </p:nvSpPr>
         <p:spPr>
           <a:xfrm>
-            <a:off x="2739728" y="5176486"/>
+            <a:off x="2511128" y="5239027"/>
             <a:ext cx="1724025" cy="386114"/>
           </a:xfrm>
           <a:prstGeom prst="rect">
@@ -4210,8 +4210,8 @@
         </p:nvSpPr>
         <p:spPr>
           <a:xfrm>
-            <a:off x="4355863" y="3581400"/>
-            <a:ext cx="1663937" cy="457200"/>
+            <a:off x="4922925" y="3643941"/>
+            <a:ext cx="1124417" cy="457200"/>
           </a:xfrm>
           <a:prstGeom prst="rect">
             <a:avLst/>
@@ -4254,7 +4254,7 @@
         </p:nvCxnSpPr>
         <p:spPr>
           <a:xfrm flipV="1">
-            <a:off x="3810000" y="4343401"/>
+            <a:off x="3581400" y="4405942"/>
             <a:ext cx="1" cy="833085"/>
           </a:xfrm>
           <a:prstGeom prst="straightConnector1">
@@ -4296,7 +4296,7 @@
         </p:nvSpPr>
         <p:spPr>
           <a:xfrm>
-            <a:off x="457200" y="3048000"/>
+            <a:off x="228600" y="3336164"/>
             <a:ext cx="609600" cy="307777"/>
           </a:xfrm>
           <a:prstGeom prst="rect">
@@ -4421,7 +4421,7 @@
         </p:nvCxnSpPr>
         <p:spPr>
           <a:xfrm flipH="1" flipV="1">
-            <a:off x="3816231" y="5867400"/>
+            <a:off x="3587631" y="5929941"/>
             <a:ext cx="1" cy="544082"/>
           </a:xfrm>
           <a:prstGeom prst="straightConnector1">
@@ -4459,7 +4459,7 @@
         </p:nvSpPr>
         <p:spPr>
           <a:xfrm>
-            <a:off x="2908063" y="6411482"/>
+            <a:off x="2679463" y="6474023"/>
             <a:ext cx="1816337" cy="307777"/>
           </a:xfrm>
           <a:prstGeom prst="rect">
@@ -4598,7 +4598,7 @@
         </p:nvSpPr>
         <p:spPr>
           <a:xfrm>
-            <a:off x="5029200" y="838200"/>
+            <a:off x="6348134" y="1191666"/>
             <a:ext cx="1076146" cy="361770"/>
           </a:xfrm>
           <a:prstGeom prst="rect">
@@ -4636,57 +4636,13 @@
       </p:sp>
       <p:sp>
         <p:nvSpPr>
-          <p:cNvPr id="97" name="Rectangle 96"/>
-          <p:cNvSpPr/>
-          <p:nvPr/>
-        </p:nvSpPr>
-        <p:spPr>
-          <a:xfrm>
-            <a:off x="6186577" y="1467030"/>
-            <a:ext cx="1204823" cy="361770"/>
-          </a:xfrm>
-          <a:prstGeom prst="rect">
-            <a:avLst/>
-          </a:prstGeom>
-        </p:spPr>
-        <p:style>
-          <a:lnRef idx="2">
-            <a:schemeClr val="accent6">
-              <a:shade val="50000"/>
-            </a:schemeClr>
-          </a:lnRef>
-          <a:fillRef idx="1">
-            <a:schemeClr val="accent6"/>
-          </a:fillRef>
-          <a:effectRef idx="0">
-            <a:schemeClr val="accent6"/>
-          </a:effectRef>
-          <a:fontRef idx="minor">
-            <a:schemeClr val="lt1"/>
-          </a:fontRef>
-        </p:style>
-        <p:txBody>
-          <a:bodyPr rtlCol="0" anchor="ctr"/>
-          <a:lstStyle/>
-          <a:p>
-            <a:pPr algn="ctr"/>
-            <a:r>
-              <a:rPr lang="en-US" sz="1600" b="1" dirty="0" smtClean="0"/>
-              <a:t>Coordinator</a:t>
-            </a:r>
-            <a:endParaRPr lang="en-SG" sz="1600" b="1" dirty="0"/>
-          </a:p>
-        </p:txBody>
-      </p:sp>
-      <p:sp>
-        <p:nvSpPr>
           <p:cNvPr id="101" name="Rectangle 100"/>
           <p:cNvSpPr/>
           <p:nvPr/>
         </p:nvSpPr>
         <p:spPr>
           <a:xfrm>
-            <a:off x="2971800" y="901941"/>
+            <a:off x="3177145" y="1348684"/>
             <a:ext cx="1204823" cy="361770"/>
           </a:xfrm>
           <a:prstGeom prst="rect">
@@ -4730,7 +4686,7 @@
         </p:nvSpPr>
         <p:spPr>
           <a:xfrm>
-            <a:off x="4456767" y="1467030"/>
+            <a:off x="4723933" y="1783792"/>
             <a:ext cx="877233" cy="361770"/>
           </a:xfrm>
           <a:prstGeom prst="rect">
@@ -4774,7 +4730,7 @@
         </p:nvCxnSpPr>
         <p:spPr>
           <a:xfrm flipV="1">
-            <a:off x="6172200" y="5562600"/>
+            <a:off x="5943600" y="5625141"/>
             <a:ext cx="1" cy="848882"/>
           </a:xfrm>
           <a:prstGeom prst="straightConnector1">
@@ -4812,7 +4768,7 @@
         </p:nvSpPr>
         <p:spPr>
           <a:xfrm>
-            <a:off x="5181600" y="6321623"/>
+            <a:off x="4953000" y="6384164"/>
             <a:ext cx="1816337" cy="307777"/>
           </a:xfrm>
           <a:prstGeom prst="rect">
@@ -4934,48 +4890,9 @@
           <p:nvPr/>
         </p:nvCxnSpPr>
         <p:spPr>
-          <a:xfrm>
-            <a:off x="5867400" y="1219200"/>
-            <a:ext cx="406904" cy="1762215"/>
-          </a:xfrm>
-          <a:prstGeom prst="straightConnector1">
-            <a:avLst/>
-          </a:prstGeom>
-          <a:ln>
-            <a:prstDash val="sysDot"/>
-            <a:headEnd type="arrow" w="med" len="med"/>
-            <a:tailEnd type="none" w="med" len="med"/>
-          </a:ln>
-        </p:spPr>
-        <p:style>
-          <a:lnRef idx="2">
-            <a:schemeClr val="accent6">
-              <a:shade val="50000"/>
-            </a:schemeClr>
-          </a:lnRef>
-          <a:fillRef idx="1">
-            <a:schemeClr val="accent6"/>
-          </a:fillRef>
-          <a:effectRef idx="0">
-            <a:schemeClr val="accent6"/>
-          </a:effectRef>
-          <a:fontRef idx="minor">
-            <a:schemeClr val="lt1"/>
-          </a:fontRef>
-        </p:style>
-      </p:cxnSp>
-      <p:cxnSp>
-        <p:nvCxnSpPr>
-          <p:cNvPr id="124" name="Straight Arrow Connector 123"/>
-          <p:cNvCxnSpPr>
-            <a:stCxn id="97" idx="2"/>
-          </p:cNvCxnSpPr>
-          <p:nvPr/>
-        </p:nvCxnSpPr>
-        <p:spPr>
           <a:xfrm flipH="1">
-            <a:off x="6345832" y="1828800"/>
-            <a:ext cx="443157" cy="1142647"/>
+            <a:off x="6755482" y="1553436"/>
+            <a:ext cx="13855" cy="2131935"/>
           </a:xfrm>
           <a:prstGeom prst="straightConnector1">
             <a:avLst/>
@@ -5011,8 +4928,8 @@
         </p:nvCxnSpPr>
         <p:spPr>
           <a:xfrm>
-            <a:off x="4876800" y="1828800"/>
-            <a:ext cx="0" cy="1752600"/>
+            <a:off x="5029200" y="2157864"/>
+            <a:ext cx="0" cy="1486077"/>
           </a:xfrm>
           <a:prstGeom prst="straightConnector1">
             <a:avLst/>
@@ -5053,8 +4970,8 @@
         </p:nvCxnSpPr>
         <p:spPr>
           <a:xfrm>
-            <a:off x="3601740" y="1235936"/>
-            <a:ext cx="55860" cy="1812064"/>
+            <a:off x="3657600" y="1710454"/>
+            <a:ext cx="0" cy="1933487"/>
           </a:xfrm>
           <a:prstGeom prst="straightConnector1">
             <a:avLst/>
@@ -5067,6 +4984,302 @@
             </a:solidFill>
             <a:prstDash val="sysDot"/>
             <a:headEnd type="arrow" w="med" len="med"/>
+            <a:tailEnd type="none" w="med" len="med"/>
+          </a:ln>
+        </p:spPr>
+        <p:style>
+          <a:lnRef idx="2">
+            <a:schemeClr val="accent6">
+              <a:shade val="50000"/>
+            </a:schemeClr>
+          </a:lnRef>
+          <a:fillRef idx="1">
+            <a:schemeClr val="accent6"/>
+          </a:fillRef>
+          <a:effectRef idx="0">
+            <a:schemeClr val="accent6"/>
+          </a:effectRef>
+          <a:fontRef idx="minor">
+            <a:schemeClr val="lt1"/>
+          </a:fontRef>
+        </p:style>
+      </p:cxnSp>
+      <p:sp>
+        <p:nvSpPr>
+          <p:cNvPr id="56" name="Rectangle 55"/>
+          <p:cNvSpPr/>
+          <p:nvPr/>
+        </p:nvSpPr>
+        <p:spPr>
+          <a:xfrm>
+            <a:off x="1995102" y="788371"/>
+            <a:ext cx="1182043" cy="304800"/>
+          </a:xfrm>
+          <a:prstGeom prst="rect">
+            <a:avLst/>
+          </a:prstGeom>
+        </p:spPr>
+        <p:style>
+          <a:lnRef idx="2">
+            <a:schemeClr val="accent1">
+              <a:shade val="50000"/>
+            </a:schemeClr>
+          </a:lnRef>
+          <a:fillRef idx="1">
+            <a:schemeClr val="accent1"/>
+          </a:fillRef>
+          <a:effectRef idx="0">
+            <a:schemeClr val="accent1"/>
+          </a:effectRef>
+          <a:fontRef idx="minor">
+            <a:schemeClr val="lt1"/>
+          </a:fontRef>
+        </p:style>
+        <p:txBody>
+          <a:bodyPr rtlCol="0" anchor="ctr"/>
+          <a:lstStyle/>
+          <a:p>
+            <a:pPr algn="ctr"/>
+            <a:r>
+              <a:rPr lang="en-US" sz="1600" b="1" dirty="0" smtClean="0"/>
+              <a:t>Submission</a:t>
+            </a:r>
+            <a:endParaRPr lang="en-SG" sz="1600" b="1" dirty="0"/>
+          </a:p>
+        </p:txBody>
+      </p:sp>
+      <p:cxnSp>
+        <p:nvCxnSpPr>
+          <p:cNvPr id="38" name="Straight Arrow Connector 37"/>
+          <p:cNvCxnSpPr/>
+          <p:nvPr/>
+        </p:nvCxnSpPr>
+        <p:spPr>
+          <a:xfrm>
+            <a:off x="2362200" y="1093171"/>
+            <a:ext cx="0" cy="2550770"/>
+          </a:xfrm>
+          <a:prstGeom prst="straightConnector1">
+            <a:avLst/>
+          </a:prstGeom>
+          <a:ln>
+            <a:solidFill>
+              <a:schemeClr val="tx2"/>
+            </a:solidFill>
+            <a:prstDash val="sysDot"/>
+            <a:headEnd type="arrow" w="med" len="med"/>
+            <a:tailEnd type="none" w="med" len="med"/>
+          </a:ln>
+        </p:spPr>
+        <p:style>
+          <a:lnRef idx="2">
+            <a:schemeClr val="accent6">
+              <a:shade val="50000"/>
+            </a:schemeClr>
+          </a:lnRef>
+          <a:fillRef idx="1">
+            <a:schemeClr val="accent6"/>
+          </a:fillRef>
+          <a:effectRef idx="0">
+            <a:schemeClr val="accent6"/>
+          </a:effectRef>
+          <a:fontRef idx="minor">
+            <a:schemeClr val="lt1"/>
+          </a:fontRef>
+        </p:style>
+      </p:cxnSp>
+      <p:sp>
+        <p:nvSpPr>
+          <p:cNvPr id="53" name="Rectangle 52"/>
+          <p:cNvSpPr/>
+          <p:nvPr/>
+        </p:nvSpPr>
+        <p:spPr>
+          <a:xfrm>
+            <a:off x="1752600" y="3643941"/>
+            <a:ext cx="1468139" cy="457200"/>
+          </a:xfrm>
+          <a:prstGeom prst="rect">
+            <a:avLst/>
+          </a:prstGeom>
+        </p:spPr>
+        <p:style>
+          <a:lnRef idx="2">
+            <a:schemeClr val="accent1">
+              <a:shade val="50000"/>
+            </a:schemeClr>
+          </a:lnRef>
+          <a:fillRef idx="1">
+            <a:schemeClr val="accent1"/>
+          </a:fillRef>
+          <a:effectRef idx="0">
+            <a:schemeClr val="accent1"/>
+          </a:effectRef>
+          <a:fontRef idx="minor">
+            <a:schemeClr val="lt1"/>
+          </a:fontRef>
+        </p:style>
+        <p:txBody>
+          <a:bodyPr rtlCol="0" anchor="ctr"/>
+          <a:lstStyle/>
+          <a:p>
+            <a:pPr algn="ctr"/>
+            <a:r>
+              <a:rPr lang="en-US" sz="1600" b="1" dirty="0" err="1" smtClean="0"/>
+              <a:t>SubmissionsDb</a:t>
+            </a:r>
+            <a:endParaRPr lang="en-SG" sz="1600" b="1" dirty="0"/>
+          </a:p>
+        </p:txBody>
+      </p:sp>
+      <p:cxnSp>
+        <p:nvCxnSpPr>
+          <p:cNvPr id="26" name="Elbow Connector 25"/>
+          <p:cNvCxnSpPr>
+            <a:stCxn id="56" idx="3"/>
+            <a:endCxn id="96" idx="0"/>
+          </p:cNvCxnSpPr>
+          <p:nvPr/>
+        </p:nvCxnSpPr>
+        <p:spPr>
+          <a:xfrm>
+            <a:off x="3177145" y="940771"/>
+            <a:ext cx="3709062" cy="250895"/>
+          </a:xfrm>
+          <a:prstGeom prst="bentConnector2">
+            <a:avLst/>
+          </a:prstGeom>
+          <a:ln w="57150" cmpd="dbl">
+            <a:solidFill>
+              <a:schemeClr val="tx2"/>
+            </a:solidFill>
+            <a:prstDash val="solid"/>
+            <a:headEnd type="none" w="med" len="med"/>
+            <a:tailEnd type="triangle" w="med" len="med"/>
+          </a:ln>
+        </p:spPr>
+        <p:style>
+          <a:lnRef idx="2">
+            <a:schemeClr val="accent6">
+              <a:shade val="50000"/>
+            </a:schemeClr>
+          </a:lnRef>
+          <a:fillRef idx="1">
+            <a:schemeClr val="accent6"/>
+          </a:fillRef>
+          <a:effectRef idx="0">
+            <a:schemeClr val="accent6"/>
+          </a:effectRef>
+          <a:fontRef idx="minor">
+            <a:schemeClr val="lt1"/>
+          </a:fontRef>
+        </p:style>
+      </p:cxnSp>
+      <p:sp>
+        <p:nvSpPr>
+          <p:cNvPr id="27" name="Diamond 26"/>
+          <p:cNvSpPr/>
+          <p:nvPr/>
+        </p:nvSpPr>
+        <p:spPr>
+          <a:xfrm>
+            <a:off x="4516140" y="1891341"/>
+            <a:ext cx="208260" cy="151078"/>
+          </a:xfrm>
+          <a:prstGeom prst="diamond">
+            <a:avLst/>
+          </a:prstGeom>
+        </p:spPr>
+        <p:style>
+          <a:lnRef idx="2">
+            <a:schemeClr val="accent4">
+              <a:shade val="50000"/>
+            </a:schemeClr>
+          </a:lnRef>
+          <a:fillRef idx="1">
+            <a:schemeClr val="accent4"/>
+          </a:fillRef>
+          <a:effectRef idx="0">
+            <a:schemeClr val="accent4"/>
+          </a:effectRef>
+          <a:fontRef idx="minor">
+            <a:schemeClr val="lt1"/>
+          </a:fontRef>
+        </p:style>
+        <p:txBody>
+          <a:bodyPr rtlCol="0" anchor="ctr"/>
+          <a:lstStyle/>
+          <a:p>
+            <a:pPr algn="ctr"/>
+            <a:endParaRPr lang="en-SG" sz="1600" b="1"/>
+          </a:p>
+        </p:txBody>
+      </p:sp>
+      <p:sp>
+        <p:nvSpPr>
+          <p:cNvPr id="54" name="Diamond 53"/>
+          <p:cNvSpPr/>
+          <p:nvPr/>
+        </p:nvSpPr>
+        <p:spPr>
+          <a:xfrm>
+            <a:off x="2968885" y="1477897"/>
+            <a:ext cx="208260" cy="151078"/>
+          </a:xfrm>
+          <a:prstGeom prst="diamond">
+            <a:avLst/>
+          </a:prstGeom>
+        </p:spPr>
+        <p:style>
+          <a:lnRef idx="2">
+            <a:schemeClr val="accent5">
+              <a:shade val="50000"/>
+            </a:schemeClr>
+          </a:lnRef>
+          <a:fillRef idx="1">
+            <a:schemeClr val="accent5"/>
+          </a:fillRef>
+          <a:effectRef idx="0">
+            <a:schemeClr val="accent5"/>
+          </a:effectRef>
+          <a:fontRef idx="minor">
+            <a:schemeClr val="lt1"/>
+          </a:fontRef>
+        </p:style>
+        <p:txBody>
+          <a:bodyPr rtlCol="0" anchor="ctr"/>
+          <a:lstStyle/>
+          <a:p>
+            <a:pPr algn="ctr"/>
+            <a:endParaRPr lang="en-SG" sz="1600" b="1"/>
+          </a:p>
+        </p:txBody>
+      </p:sp>
+      <p:cxnSp>
+        <p:nvCxnSpPr>
+          <p:cNvPr id="55" name="Elbow Connector 54"/>
+          <p:cNvCxnSpPr>
+            <a:stCxn id="27" idx="1"/>
+            <a:endCxn id="101" idx="2"/>
+          </p:cNvCxnSpPr>
+          <p:nvPr/>
+        </p:nvCxnSpPr>
+        <p:spPr>
+          <a:xfrm rot="10800000">
+            <a:off x="3779558" y="1710454"/>
+            <a:ext cx="736583" cy="256426"/>
+          </a:xfrm>
+          <a:prstGeom prst="bentConnector2">
+            <a:avLst/>
+          </a:prstGeom>
+          <a:ln w="57150" cmpd="dbl">
+            <a:solidFill>
+              <a:schemeClr val="accent5">
+                <a:lumMod val="75000"/>
+              </a:schemeClr>
+            </a:solidFill>
+            <a:prstDash val="solid"/>
+            <a:headEnd type="triangle" w="med" len="med"/>
             <a:tailEnd type="none" w="med" len="med"/>
           </a:ln>
         </p:spPr>
@@ -5089,68 +5302,73 @@
       </p:cxnSp>
       <p:cxnSp>
         <p:nvCxnSpPr>
-          <p:cNvPr id="141" name="Straight Arrow Connector 140"/>
-          <p:cNvCxnSpPr/>
+          <p:cNvPr id="61" name="Elbow Connector 60"/>
+          <p:cNvCxnSpPr>
+            <a:stCxn id="54" idx="1"/>
+          </p:cNvCxnSpPr>
           <p:nvPr/>
         </p:nvCxnSpPr>
         <p:spPr>
-          <a:xfrm flipH="1">
-            <a:off x="2438400" y="1905000"/>
-            <a:ext cx="35474" cy="1676400"/>
-          </a:xfrm>
-          <a:prstGeom prst="straightConnector1">
+          <a:xfrm rot="10800000">
+            <a:off x="2586123" y="1093172"/>
+            <a:ext cx="382762" cy="460265"/>
+          </a:xfrm>
+          <a:prstGeom prst="bentConnector2">
             <a:avLst/>
           </a:prstGeom>
-          <a:ln>
-            <a:prstDash val="dot"/>
-            <a:headEnd type="arrow" w="med" len="med"/>
+          <a:ln w="57150" cmpd="dbl">
+            <a:solidFill>
+              <a:schemeClr val="tx2"/>
+            </a:solidFill>
+            <a:prstDash val="solid"/>
+            <a:headEnd type="triangle" w="med" len="med"/>
             <a:tailEnd type="none" w="med" len="med"/>
           </a:ln>
+        </p:spPr>
+        <p:style>
+          <a:lnRef idx="2">
+            <a:schemeClr val="accent6">
+              <a:shade val="50000"/>
+            </a:schemeClr>
+          </a:lnRef>
+          <a:fillRef idx="1">
+            <a:schemeClr val="accent6"/>
+          </a:fillRef>
+          <a:effectRef idx="0">
+            <a:schemeClr val="accent6"/>
+          </a:effectRef>
+          <a:fontRef idx="minor">
+            <a:schemeClr val="lt1"/>
+          </a:fontRef>
+        </p:style>
+      </p:cxnSp>
+      <p:sp>
+        <p:nvSpPr>
+          <p:cNvPr id="72" name="Rectangle 71"/>
+          <p:cNvSpPr/>
+          <p:nvPr/>
+        </p:nvSpPr>
+        <p:spPr>
+          <a:xfrm>
+            <a:off x="7314267" y="1752239"/>
+            <a:ext cx="991533" cy="361770"/>
+          </a:xfrm>
+          <a:prstGeom prst="rect">
+            <a:avLst/>
+          </a:prstGeom>
         </p:spPr>
         <p:style>
           <a:lnRef idx="2">
             <a:schemeClr val="accent3"/>
           </a:lnRef>
-          <a:fillRef idx="0">
-            <a:schemeClr val="accent3"/>
-          </a:fillRef>
-          <a:effectRef idx="1">
-            <a:schemeClr val="accent3"/>
-          </a:effectRef>
-          <a:fontRef idx="minor">
-            <a:schemeClr val="tx1"/>
-          </a:fontRef>
-        </p:style>
-      </p:cxnSp>
-      <p:sp>
-        <p:nvSpPr>
-          <p:cNvPr id="53" name="Rectangle 52"/>
-          <p:cNvSpPr/>
-          <p:nvPr/>
-        </p:nvSpPr>
-        <p:spPr>
-          <a:xfrm>
-            <a:off x="2133600" y="3581400"/>
-            <a:ext cx="2000250" cy="457200"/>
-          </a:xfrm>
-          <a:prstGeom prst="rect">
-            <a:avLst/>
-          </a:prstGeom>
-        </p:spPr>
-        <p:style>
-          <a:lnRef idx="2">
-            <a:schemeClr val="accent3">
-              <a:shade val="50000"/>
-            </a:schemeClr>
-          </a:lnRef>
           <a:fillRef idx="1">
-            <a:schemeClr val="accent3"/>
+            <a:schemeClr val="lt1"/>
           </a:fillRef>
           <a:effectRef idx="0">
             <a:schemeClr val="accent3"/>
           </a:effectRef>
           <a:fontRef idx="minor">
-            <a:schemeClr val="lt1"/>
+            <a:schemeClr val="dk1"/>
           </a:fontRef>
         </p:style>
         <p:txBody>
@@ -5160,43 +5378,140 @@
             <a:pPr algn="ctr"/>
             <a:r>
               <a:rPr lang="en-US" sz="1600" b="1" dirty="0" err="1" smtClean="0"/>
-              <a:t>SubmissionsDb</a:t>
+              <a:t>GoogleId</a:t>
             </a:r>
             <a:endParaRPr lang="en-SG" sz="1600" b="1" dirty="0"/>
           </a:p>
         </p:txBody>
       </p:sp>
-      <p:sp>
-        <p:nvSpPr>
-          <p:cNvPr id="56" name="Rectangle 55"/>
-          <p:cNvSpPr/>
+      <p:cxnSp>
+        <p:nvCxnSpPr>
+          <p:cNvPr id="73" name="Elbow Connector 72"/>
+          <p:cNvCxnSpPr>
+            <a:stCxn id="72" idx="0"/>
+            <a:endCxn id="96" idx="3"/>
+          </p:cNvCxnSpPr>
           <p:nvPr/>
-        </p:nvSpPr>
-        <p:spPr>
-          <a:xfrm>
-            <a:off x="2133600" y="1600200"/>
-            <a:ext cx="1371600" cy="304800"/>
-          </a:xfrm>
-          <a:prstGeom prst="rect">
+        </p:nvCxnSpPr>
+        <p:spPr>
+          <a:xfrm rot="16200000" flipV="1">
+            <a:off x="7427313" y="1369518"/>
+            <a:ext cx="379688" cy="385754"/>
+          </a:xfrm>
+          <a:prstGeom prst="bentConnector2">
             <a:avLst/>
           </a:prstGeom>
+          <a:ln w="57150" cmpd="dbl">
+            <a:solidFill>
+              <a:schemeClr val="accent6">
+                <a:lumMod val="50000"/>
+              </a:schemeClr>
+            </a:solidFill>
+            <a:prstDash val="solid"/>
+            <a:headEnd type="triangle" w="med" len="med"/>
+            <a:tailEnd type="none" w="med" len="med"/>
+          </a:ln>
         </p:spPr>
         <p:style>
           <a:lnRef idx="2">
-            <a:schemeClr val="accent3">
+            <a:schemeClr val="accent6">
               <a:shade val="50000"/>
             </a:schemeClr>
           </a:lnRef>
           <a:fillRef idx="1">
-            <a:schemeClr val="accent3"/>
+            <a:schemeClr val="accent6"/>
           </a:fillRef>
           <a:effectRef idx="0">
-            <a:schemeClr val="accent3"/>
+            <a:schemeClr val="accent6"/>
           </a:effectRef>
           <a:fontRef idx="minor">
             <a:schemeClr val="lt1"/>
           </a:fontRef>
         </p:style>
+      </p:cxnSp>
+      <p:cxnSp>
+        <p:nvCxnSpPr>
+          <p:cNvPr id="77" name="Elbow Connector 76"/>
+          <p:cNvCxnSpPr>
+            <a:stCxn id="106" idx="0"/>
+            <a:endCxn id="96" idx="1"/>
+          </p:cNvCxnSpPr>
+          <p:nvPr/>
+        </p:nvCxnSpPr>
+        <p:spPr>
+          <a:xfrm rot="5400000" flipH="1" flipV="1">
+            <a:off x="5549722" y="985380"/>
+            <a:ext cx="411241" cy="1185584"/>
+          </a:xfrm>
+          <a:prstGeom prst="bentConnector2">
+            <a:avLst/>
+          </a:prstGeom>
+          <a:ln w="57150" cmpd="dbl">
+            <a:solidFill>
+              <a:schemeClr val="accent6">
+                <a:lumMod val="50000"/>
+              </a:schemeClr>
+            </a:solidFill>
+            <a:prstDash val="solid"/>
+            <a:headEnd type="triangle" w="med" len="med"/>
+            <a:tailEnd type="none" w="med" len="med"/>
+          </a:ln>
+        </p:spPr>
+        <p:style>
+          <a:lnRef idx="2">
+            <a:schemeClr val="accent6">
+              <a:shade val="50000"/>
+            </a:schemeClr>
+          </a:lnRef>
+          <a:fillRef idx="1">
+            <a:schemeClr val="accent6"/>
+          </a:fillRef>
+          <a:effectRef idx="0">
+            <a:schemeClr val="accent6"/>
+          </a:effectRef>
+          <a:fontRef idx="minor">
+            <a:schemeClr val="lt1"/>
+          </a:fontRef>
+        </p:style>
+      </p:cxnSp>
+      <p:sp>
+        <p:nvSpPr>
+          <p:cNvPr id="97" name="Rectangle 96"/>
+          <p:cNvSpPr/>
+          <p:nvPr/>
+        </p:nvSpPr>
+        <p:spPr>
+          <a:xfrm>
+            <a:off x="6288414" y="2338749"/>
+            <a:ext cx="1204823" cy="361770"/>
+          </a:xfrm>
+          <a:prstGeom prst="rect">
+            <a:avLst/>
+          </a:prstGeom>
+          <a:effectLst>
+            <a:glow rad="254000">
+              <a:schemeClr val="bg1">
+                <a:alpha val="70000"/>
+              </a:schemeClr>
+            </a:glow>
+          </a:effectLst>
+        </p:spPr>
+        <p:style>
+          <a:lnRef idx="2">
+            <a:schemeClr val="accent6">
+              <a:shade val="50000"/>
+            </a:schemeClr>
+          </a:lnRef>
+          <a:fillRef idx="1">
+            <a:schemeClr val="accent6"/>
+          </a:fillRef>
+          <a:effectRef idx="0">
+            <a:schemeClr val="accent6"/>
+          </a:effectRef>
+          <a:fontRef idx="minor">
+            <a:schemeClr val="lt1"/>
+          </a:fontRef>
+        </p:style>
         <p:txBody>
           <a:bodyPr rtlCol="0" anchor="ctr"/>
           <a:lstStyle/>
@@ -5204,9 +5519,385 @@
             <a:pPr algn="ctr"/>
             <a:r>
               <a:rPr lang="en-US" sz="1600" b="1" dirty="0" smtClean="0"/>
-              <a:t>Submission</a:t>
+              <a:t>Coordinator</a:t>
             </a:r>
             <a:endParaRPr lang="en-SG" sz="1600" b="1" dirty="0"/>
+          </a:p>
+        </p:txBody>
+      </p:sp>
+      <p:cxnSp>
+        <p:nvCxnSpPr>
+          <p:cNvPr id="124" name="Straight Arrow Connector 123"/>
+          <p:cNvCxnSpPr>
+            <a:stCxn id="97" idx="2"/>
+          </p:cNvCxnSpPr>
+          <p:nvPr/>
+        </p:nvCxnSpPr>
+        <p:spPr>
+          <a:xfrm flipH="1">
+            <a:off x="6886207" y="2700519"/>
+            <a:ext cx="4619" cy="943422"/>
+          </a:xfrm>
+          <a:prstGeom prst="straightConnector1">
+            <a:avLst/>
+          </a:prstGeom>
+          <a:ln>
+            <a:prstDash val="sysDot"/>
+            <a:headEnd type="arrow" w="med" len="med"/>
+            <a:tailEnd type="none" w="med" len="med"/>
+          </a:ln>
+        </p:spPr>
+        <p:style>
+          <a:lnRef idx="2">
+            <a:schemeClr val="accent6">
+              <a:shade val="50000"/>
+            </a:schemeClr>
+          </a:lnRef>
+          <a:fillRef idx="1">
+            <a:schemeClr val="accent6"/>
+          </a:fillRef>
+          <a:effectRef idx="0">
+            <a:schemeClr val="accent6"/>
+          </a:effectRef>
+          <a:fontRef idx="minor">
+            <a:schemeClr val="lt1"/>
+          </a:fontRef>
+        </p:style>
+      </p:cxnSp>
+      <p:cxnSp>
+        <p:nvCxnSpPr>
+          <p:cNvPr id="74" name="Elbow Connector 73"/>
+          <p:cNvCxnSpPr>
+            <a:stCxn id="72" idx="2"/>
+            <a:endCxn id="97" idx="3"/>
+          </p:cNvCxnSpPr>
+          <p:nvPr/>
+        </p:nvCxnSpPr>
+        <p:spPr>
+          <a:xfrm rot="5400000">
+            <a:off x="7448824" y="2158423"/>
+            <a:ext cx="405625" cy="316797"/>
+          </a:xfrm>
+          <a:prstGeom prst="bentConnector2">
+            <a:avLst/>
+          </a:prstGeom>
+          <a:ln w="57150" cmpd="dbl">
+            <a:solidFill>
+              <a:schemeClr val="accent6">
+                <a:lumMod val="50000"/>
+              </a:schemeClr>
+            </a:solidFill>
+            <a:prstDash val="solid"/>
+            <a:headEnd type="triangle" w="med" len="med"/>
+            <a:tailEnd type="none" w="med" len="med"/>
+          </a:ln>
+        </p:spPr>
+        <p:style>
+          <a:lnRef idx="2">
+            <a:schemeClr val="accent6">
+              <a:shade val="50000"/>
+            </a:schemeClr>
+          </a:lnRef>
+          <a:fillRef idx="1">
+            <a:schemeClr val="accent6"/>
+          </a:fillRef>
+          <a:effectRef idx="0">
+            <a:schemeClr val="accent6"/>
+          </a:effectRef>
+          <a:fontRef idx="minor">
+            <a:schemeClr val="lt1"/>
+          </a:fontRef>
+        </p:style>
+      </p:cxnSp>
+      <p:sp>
+        <p:nvSpPr>
+          <p:cNvPr id="57" name="TextBox 56"/>
+          <p:cNvSpPr txBox="1"/>
+          <p:nvPr/>
+        </p:nvSpPr>
+        <p:spPr>
+          <a:xfrm>
+            <a:off x="4934691" y="1552143"/>
+            <a:ext cx="170709" cy="200457"/>
+          </a:xfrm>
+          <a:prstGeom prst="rect">
+            <a:avLst/>
+          </a:prstGeom>
+          <a:noFill/>
+        </p:spPr>
+        <p:txBody>
+          <a:bodyPr wrap="square" lIns="0" tIns="0" rIns="0" bIns="0" rtlCol="0" anchor="ctr" anchorCtr="0">
+            <a:noAutofit/>
+          </a:bodyPr>
+          <a:lstStyle/>
+          <a:p>
+            <a:r>
+              <a:rPr lang="en-US" b="1" dirty="0" smtClean="0">
+                <a:solidFill>
+                  <a:schemeClr val="accent4"/>
+                </a:solidFill>
+              </a:rPr>
+              <a:t>*</a:t>
+            </a:r>
+            <a:endParaRPr lang="en-SG" b="1" dirty="0">
+              <a:solidFill>
+                <a:schemeClr val="accent4"/>
+              </a:solidFill>
+            </a:endParaRPr>
+          </a:p>
+        </p:txBody>
+      </p:sp>
+      <p:sp>
+        <p:nvSpPr>
+          <p:cNvPr id="87" name="TextBox 86"/>
+          <p:cNvSpPr txBox="1"/>
+          <p:nvPr/>
+        </p:nvSpPr>
+        <p:spPr>
+          <a:xfrm>
+            <a:off x="7006027" y="941205"/>
+            <a:ext cx="170709" cy="200457"/>
+          </a:xfrm>
+          <a:prstGeom prst="rect">
+            <a:avLst/>
+          </a:prstGeom>
+          <a:noFill/>
+        </p:spPr>
+        <p:txBody>
+          <a:bodyPr wrap="square" lIns="0" tIns="0" rIns="0" bIns="0" rtlCol="0" anchor="ctr" anchorCtr="0">
+            <a:noAutofit/>
+          </a:bodyPr>
+          <a:lstStyle/>
+          <a:p>
+            <a:r>
+              <a:rPr lang="en-US" sz="1600" dirty="0" smtClean="0">
+                <a:solidFill>
+                  <a:schemeClr val="accent6">
+                    <a:lumMod val="75000"/>
+                  </a:schemeClr>
+                </a:solidFill>
+              </a:rPr>
+              <a:t>2</a:t>
+            </a:r>
+            <a:endParaRPr lang="en-SG" sz="1600" dirty="0">
+              <a:solidFill>
+                <a:schemeClr val="accent6">
+                  <a:lumMod val="75000"/>
+                </a:schemeClr>
+              </a:solidFill>
+            </a:endParaRPr>
+          </a:p>
+        </p:txBody>
+      </p:sp>
+      <p:sp>
+        <p:nvSpPr>
+          <p:cNvPr id="88" name="TextBox 87"/>
+          <p:cNvSpPr txBox="1"/>
+          <p:nvPr/>
+        </p:nvSpPr>
+        <p:spPr>
+          <a:xfrm>
+            <a:off x="6115559" y="2232368"/>
+            <a:ext cx="170709" cy="200457"/>
+          </a:xfrm>
+          <a:prstGeom prst="rect">
+            <a:avLst/>
+          </a:prstGeom>
+          <a:noFill/>
+        </p:spPr>
+        <p:txBody>
+          <a:bodyPr wrap="square" lIns="0" tIns="0" rIns="0" bIns="0" rtlCol="0" anchor="ctr" anchorCtr="0">
+            <a:noAutofit/>
+          </a:bodyPr>
+          <a:lstStyle/>
+          <a:p>
+            <a:r>
+              <a:rPr lang="en-US" sz="1600" dirty="0" smtClean="0">
+                <a:solidFill>
+                  <a:schemeClr val="accent6">
+                    <a:lumMod val="75000"/>
+                  </a:schemeClr>
+                </a:solidFill>
+              </a:rPr>
+              <a:t>1</a:t>
+            </a:r>
+            <a:endParaRPr lang="en-SG" sz="1600" dirty="0">
+              <a:solidFill>
+                <a:schemeClr val="accent6">
+                  <a:lumMod val="75000"/>
+                </a:schemeClr>
+              </a:solidFill>
+            </a:endParaRPr>
+          </a:p>
+        </p:txBody>
+      </p:sp>
+      <p:sp>
+        <p:nvSpPr>
+          <p:cNvPr id="89" name="TextBox 88"/>
+          <p:cNvSpPr txBox="1"/>
+          <p:nvPr/>
+        </p:nvSpPr>
+        <p:spPr>
+          <a:xfrm>
+            <a:off x="5219836" y="2177769"/>
+            <a:ext cx="170709" cy="200457"/>
+          </a:xfrm>
+          <a:prstGeom prst="rect">
+            <a:avLst/>
+          </a:prstGeom>
+          <a:noFill/>
+        </p:spPr>
+        <p:txBody>
+          <a:bodyPr wrap="square" lIns="0" tIns="0" rIns="0" bIns="0" rtlCol="0" anchor="ctr" anchorCtr="0">
+            <a:noAutofit/>
+          </a:bodyPr>
+          <a:lstStyle/>
+          <a:p>
+            <a:r>
+              <a:rPr lang="en-US" b="1" dirty="0" smtClean="0">
+                <a:solidFill>
+                  <a:schemeClr val="accent4"/>
+                </a:solidFill>
+              </a:rPr>
+              <a:t>*</a:t>
+            </a:r>
+            <a:endParaRPr lang="en-SG" b="1" dirty="0">
+              <a:solidFill>
+                <a:schemeClr val="accent4"/>
+              </a:solidFill>
+            </a:endParaRPr>
+          </a:p>
+        </p:txBody>
+      </p:sp>
+      <p:cxnSp>
+        <p:nvCxnSpPr>
+          <p:cNvPr id="80" name="Elbow Connector 79"/>
+          <p:cNvCxnSpPr>
+            <a:stCxn id="97" idx="1"/>
+            <a:endCxn id="106" idx="2"/>
+          </p:cNvCxnSpPr>
+          <p:nvPr/>
+        </p:nvCxnSpPr>
+        <p:spPr>
+          <a:xfrm rot="10800000">
+            <a:off x="5162550" y="2145562"/>
+            <a:ext cx="1125864" cy="374072"/>
+          </a:xfrm>
+          <a:prstGeom prst="bentConnector2">
+            <a:avLst/>
+          </a:prstGeom>
+          <a:ln w="57150" cmpd="dbl">
+            <a:solidFill>
+              <a:schemeClr val="accent6">
+                <a:lumMod val="50000"/>
+              </a:schemeClr>
+            </a:solidFill>
+            <a:prstDash val="solid"/>
+            <a:headEnd type="triangle" w="med" len="med"/>
+            <a:tailEnd type="none" w="med" len="med"/>
+          </a:ln>
+        </p:spPr>
+        <p:style>
+          <a:lnRef idx="2">
+            <a:schemeClr val="accent6">
+              <a:shade val="50000"/>
+            </a:schemeClr>
+          </a:lnRef>
+          <a:fillRef idx="1">
+            <a:schemeClr val="accent6"/>
+          </a:fillRef>
+          <a:effectRef idx="0">
+            <a:schemeClr val="accent6"/>
+          </a:effectRef>
+          <a:fontRef idx="minor">
+            <a:schemeClr val="lt1"/>
+          </a:fontRef>
+        </p:style>
+      </p:cxnSp>
+      <p:cxnSp>
+        <p:nvCxnSpPr>
+          <p:cNvPr id="60" name="Straight Arrow Connector 59"/>
+          <p:cNvCxnSpPr/>
+          <p:nvPr/>
+        </p:nvCxnSpPr>
+        <p:spPr>
+          <a:xfrm>
+            <a:off x="7263774" y="6339393"/>
+            <a:ext cx="1339498" cy="0"/>
+          </a:xfrm>
+          <a:prstGeom prst="straightConnector1">
+            <a:avLst/>
+          </a:prstGeom>
+          <a:ln w="57150" cmpd="dbl">
+            <a:solidFill>
+              <a:schemeClr val="tx1">
+                <a:lumMod val="50000"/>
+                <a:lumOff val="50000"/>
+              </a:schemeClr>
+            </a:solidFill>
+            <a:prstDash val="solid"/>
+            <a:headEnd type="none" w="med" len="med"/>
+            <a:tailEnd type="triangle" w="med" len="med"/>
+          </a:ln>
+        </p:spPr>
+        <p:style>
+          <a:lnRef idx="2">
+            <a:schemeClr val="accent6">
+              <a:shade val="50000"/>
+            </a:schemeClr>
+          </a:lnRef>
+          <a:fillRef idx="1">
+            <a:schemeClr val="accent6"/>
+          </a:fillRef>
+          <a:effectRef idx="0">
+            <a:schemeClr val="accent6"/>
+          </a:effectRef>
+          <a:fontRef idx="minor">
+            <a:schemeClr val="lt1"/>
+          </a:fontRef>
+        </p:style>
+      </p:cxnSp>
+      <p:sp>
+        <p:nvSpPr>
+          <p:cNvPr id="102" name="TextBox 101"/>
+          <p:cNvSpPr txBox="1"/>
+          <p:nvPr/>
+        </p:nvSpPr>
+        <p:spPr>
+          <a:xfrm>
+            <a:off x="7162800" y="6505143"/>
+            <a:ext cx="1669072" cy="200457"/>
+          </a:xfrm>
+          <a:prstGeom prst="rect">
+            <a:avLst/>
+          </a:prstGeom>
+          <a:noFill/>
+        </p:spPr>
+        <p:txBody>
+          <a:bodyPr wrap="square" lIns="0" tIns="0" rIns="0" bIns="0" rtlCol="0" anchor="ctr" anchorCtr="0">
+            <a:noAutofit/>
+          </a:bodyPr>
+          <a:lstStyle/>
+          <a:p>
+            <a:r>
+              <a:rPr lang="en-US" sz="1400" b="1" dirty="0" smtClean="0">
+                <a:solidFill>
+                  <a:schemeClr val="tx1">
+                    <a:lumMod val="50000"/>
+                    <a:lumOff val="50000"/>
+                  </a:schemeClr>
+                </a:solidFill>
+              </a:rPr>
+              <a:t>Associations managed using string references</a:t>
+            </a:r>
+            <a:endParaRPr lang="en-SG" sz="1400" b="1" dirty="0">
+              <a:solidFill>
+                <a:schemeClr val="tx1">
+                  <a:lumMod val="50000"/>
+                  <a:lumOff val="50000"/>
+                </a:schemeClr>
+              </a:solidFill>
+            </a:endParaRPr>
           </a:p>
         </p:txBody>
       </p:sp>
@@ -5223,7 +5914,7 @@
   <p:timing>
     <p:tnLst>
       <p:par>
-        <p:cTn xmlns:p14="http://schemas.microsoft.com/office/powerpoint/2010/main" id="1" dur="indefinite" restart="never" nodeType="tmRoot"/>
+        <p:cTn id="1" dur="indefinite" restart="never" nodeType="tmRoot"/>
       </p:par>
     </p:tnLst>
   </p:timing>

</xml_diff>

<commit_message>
Update Issue 412 [DevMan: Add association links among Storage::entity classes] Added missing composition diamond between Student and Course.
</commit_message>
<xml_diff>
--- a/doc/diagrams/StorageComponent.pptx
+++ b/doc/diagrams/StorageComponent.pptx
@@ -193,7 +193,7 @@
             <a:fld id="{AF301891-4E62-472A-98E9-95DBD40531A4}" type="datetimeFigureOut">
               <a:rPr lang="en-SG" smtClean="0"/>
               <a:pPr/>
-              <a:t>3/12/2012</a:t>
+              <a:t>5/12/2012</a:t>
             </a:fld>
             <a:endParaRPr lang="en-SG"/>
           </a:p>
@@ -729,7 +729,7 @@
             <a:fld id="{1D8BD707-D9CF-40AE-B4C6-C98DA3205C09}" type="datetimeFigureOut">
               <a:rPr lang="en-US" smtClean="0"/>
               <a:pPr/>
-              <a:t>12/3/2012</a:t>
+              <a:t>12/5/2012</a:t>
             </a:fld>
             <a:endParaRPr lang="en-US"/>
           </a:p>
@@ -896,7 +896,7 @@
             <a:fld id="{1D8BD707-D9CF-40AE-B4C6-C98DA3205C09}" type="datetimeFigureOut">
               <a:rPr lang="en-US" smtClean="0"/>
               <a:pPr/>
-              <a:t>12/3/2012</a:t>
+              <a:t>12/5/2012</a:t>
             </a:fld>
             <a:endParaRPr lang="en-US"/>
           </a:p>
@@ -1073,7 +1073,7 @@
             <a:fld id="{1D8BD707-D9CF-40AE-B4C6-C98DA3205C09}" type="datetimeFigureOut">
               <a:rPr lang="en-US" smtClean="0"/>
               <a:pPr/>
-              <a:t>12/3/2012</a:t>
+              <a:t>12/5/2012</a:t>
             </a:fld>
             <a:endParaRPr lang="en-US"/>
           </a:p>
@@ -1240,7 +1240,7 @@
             <a:fld id="{1D8BD707-D9CF-40AE-B4C6-C98DA3205C09}" type="datetimeFigureOut">
               <a:rPr lang="en-US" smtClean="0"/>
               <a:pPr/>
-              <a:t>12/3/2012</a:t>
+              <a:t>12/5/2012</a:t>
             </a:fld>
             <a:endParaRPr lang="en-US"/>
           </a:p>
@@ -1483,7 +1483,7 @@
             <a:fld id="{1D8BD707-D9CF-40AE-B4C6-C98DA3205C09}" type="datetimeFigureOut">
               <a:rPr lang="en-US" smtClean="0"/>
               <a:pPr/>
-              <a:t>12/3/2012</a:t>
+              <a:t>12/5/2012</a:t>
             </a:fld>
             <a:endParaRPr lang="en-US"/>
           </a:p>
@@ -1768,7 +1768,7 @@
             <a:fld id="{1D8BD707-D9CF-40AE-B4C6-C98DA3205C09}" type="datetimeFigureOut">
               <a:rPr lang="en-US" smtClean="0"/>
               <a:pPr/>
-              <a:t>12/3/2012</a:t>
+              <a:t>12/5/2012</a:t>
             </a:fld>
             <a:endParaRPr lang="en-US"/>
           </a:p>
@@ -2187,7 +2187,7 @@
             <a:fld id="{1D8BD707-D9CF-40AE-B4C6-C98DA3205C09}" type="datetimeFigureOut">
               <a:rPr lang="en-US" smtClean="0"/>
               <a:pPr/>
-              <a:t>12/3/2012</a:t>
+              <a:t>12/5/2012</a:t>
             </a:fld>
             <a:endParaRPr lang="en-US"/>
           </a:p>
@@ -2302,7 +2302,7 @@
             <a:fld id="{1D8BD707-D9CF-40AE-B4C6-C98DA3205C09}" type="datetimeFigureOut">
               <a:rPr lang="en-US" smtClean="0"/>
               <a:pPr/>
-              <a:t>12/3/2012</a:t>
+              <a:t>12/5/2012</a:t>
             </a:fld>
             <a:endParaRPr lang="en-US"/>
           </a:p>
@@ -2394,7 +2394,7 @@
             <a:fld id="{1D8BD707-D9CF-40AE-B4C6-C98DA3205C09}" type="datetimeFigureOut">
               <a:rPr lang="en-US" smtClean="0"/>
               <a:pPr/>
-              <a:t>12/3/2012</a:t>
+              <a:t>12/5/2012</a:t>
             </a:fld>
             <a:endParaRPr lang="en-US"/>
           </a:p>
@@ -2668,7 +2668,7 @@
             <a:fld id="{1D8BD707-D9CF-40AE-B4C6-C98DA3205C09}" type="datetimeFigureOut">
               <a:rPr lang="en-US" smtClean="0"/>
               <a:pPr/>
-              <a:t>12/3/2012</a:t>
+              <a:t>12/5/2012</a:t>
             </a:fld>
             <a:endParaRPr lang="en-US"/>
           </a:p>
@@ -2918,7 +2918,7 @@
             <a:fld id="{1D8BD707-D9CF-40AE-B4C6-C98DA3205C09}" type="datetimeFigureOut">
               <a:rPr lang="en-US" smtClean="0"/>
               <a:pPr/>
-              <a:t>12/3/2012</a:t>
+              <a:t>12/5/2012</a:t>
             </a:fld>
             <a:endParaRPr lang="en-US"/>
           </a:p>
@@ -3128,7 +3128,7 @@
             <a:fld id="{1D8BD707-D9CF-40AE-B4C6-C98DA3205C09}" type="datetimeFigureOut">
               <a:rPr lang="en-US" smtClean="0"/>
               <a:pPr/>
-              <a:t>12/3/2012</a:t>
+              <a:t>12/5/2012</a:t>
             </a:fld>
             <a:endParaRPr lang="en-US"/>
           </a:p>
@@ -4202,50 +4202,6 @@
           </a:p>
         </p:txBody>
       </p:sp>
-      <p:sp>
-        <p:nvSpPr>
-          <p:cNvPr id="116" name="Rectangle 115"/>
-          <p:cNvSpPr/>
-          <p:nvPr/>
-        </p:nvSpPr>
-        <p:spPr>
-          <a:xfrm>
-            <a:off x="4922925" y="3643941"/>
-            <a:ext cx="1124417" cy="457200"/>
-          </a:xfrm>
-          <a:prstGeom prst="rect">
-            <a:avLst/>
-          </a:prstGeom>
-        </p:spPr>
-        <p:style>
-          <a:lnRef idx="2">
-            <a:schemeClr val="accent4">
-              <a:shade val="50000"/>
-            </a:schemeClr>
-          </a:lnRef>
-          <a:fillRef idx="1">
-            <a:schemeClr val="accent4"/>
-          </a:fillRef>
-          <a:effectRef idx="0">
-            <a:schemeClr val="accent4"/>
-          </a:effectRef>
-          <a:fontRef idx="minor">
-            <a:schemeClr val="lt1"/>
-          </a:fontRef>
-        </p:style>
-        <p:txBody>
-          <a:bodyPr rtlCol="0" anchor="ctr"/>
-          <a:lstStyle/>
-          <a:p>
-            <a:pPr algn="ctr"/>
-            <a:r>
-              <a:rPr lang="en-US" sz="1600" b="1" dirty="0" err="1" smtClean="0"/>
-              <a:t>CoursesDb</a:t>
-            </a:r>
-            <a:endParaRPr lang="en-SG" sz="1600" b="1" dirty="0"/>
-          </a:p>
-        </p:txBody>
-      </p:sp>
       <p:cxnSp>
         <p:nvCxnSpPr>
           <p:cNvPr id="118" name="Straight Arrow Connector 117"/>
@@ -4678,50 +4634,6 @@
           </a:p>
         </p:txBody>
       </p:sp>
-      <p:sp>
-        <p:nvSpPr>
-          <p:cNvPr id="106" name="Rectangle 105"/>
-          <p:cNvSpPr/>
-          <p:nvPr/>
-        </p:nvSpPr>
-        <p:spPr>
-          <a:xfrm>
-            <a:off x="4723933" y="1783792"/>
-            <a:ext cx="877233" cy="361770"/>
-          </a:xfrm>
-          <a:prstGeom prst="rect">
-            <a:avLst/>
-          </a:prstGeom>
-        </p:spPr>
-        <p:style>
-          <a:lnRef idx="2">
-            <a:schemeClr val="accent4">
-              <a:shade val="50000"/>
-            </a:schemeClr>
-          </a:lnRef>
-          <a:fillRef idx="1">
-            <a:schemeClr val="accent4"/>
-          </a:fillRef>
-          <a:effectRef idx="0">
-            <a:schemeClr val="accent4"/>
-          </a:effectRef>
-          <a:fontRef idx="minor">
-            <a:schemeClr val="lt1"/>
-          </a:fontRef>
-        </p:style>
-        <p:txBody>
-          <a:bodyPr rtlCol="0" anchor="ctr"/>
-          <a:lstStyle/>
-          <a:p>
-            <a:pPr algn="ctr"/>
-            <a:r>
-              <a:rPr lang="en-US" sz="1600" b="1" dirty="0" smtClean="0"/>
-              <a:t>Course</a:t>
-            </a:r>
-            <a:endParaRPr lang="en-SG" sz="1600" b="1" dirty="0"/>
-          </a:p>
-        </p:txBody>
-      </p:sp>
       <p:cxnSp>
         <p:nvCxnSpPr>
           <p:cNvPr id="115" name="Straight Arrow Connector 114"/>
@@ -4928,7 +4840,7 @@
         </p:nvCxnSpPr>
         <p:spPr>
           <a:xfrm>
-            <a:off x="5029200" y="2157864"/>
+            <a:off x="5029200" y="2185572"/>
             <a:ext cx="0" cy="1486077"/>
           </a:xfrm>
           <a:prstGeom prst="straightConnector1">
@@ -5175,46 +5087,6 @@
           </a:fontRef>
         </p:style>
       </p:cxnSp>
-      <p:sp>
-        <p:nvSpPr>
-          <p:cNvPr id="27" name="Diamond 26"/>
-          <p:cNvSpPr/>
-          <p:nvPr/>
-        </p:nvSpPr>
-        <p:spPr>
-          <a:xfrm>
-            <a:off x="4516140" y="1891341"/>
-            <a:ext cx="208260" cy="151078"/>
-          </a:xfrm>
-          <a:prstGeom prst="diamond">
-            <a:avLst/>
-          </a:prstGeom>
-        </p:spPr>
-        <p:style>
-          <a:lnRef idx="2">
-            <a:schemeClr val="accent4">
-              <a:shade val="50000"/>
-            </a:schemeClr>
-          </a:lnRef>
-          <a:fillRef idx="1">
-            <a:schemeClr val="accent4"/>
-          </a:fillRef>
-          <a:effectRef idx="0">
-            <a:schemeClr val="accent4"/>
-          </a:effectRef>
-          <a:fontRef idx="minor">
-            <a:schemeClr val="lt1"/>
-          </a:fontRef>
-        </p:style>
-        <p:txBody>
-          <a:bodyPr rtlCol="0" anchor="ctr"/>
-          <a:lstStyle/>
-          <a:p>
-            <a:pPr algn="ctr"/>
-            <a:endParaRPr lang="en-SG" sz="1600" b="1"/>
-          </a:p>
-        </p:txBody>
-      </p:sp>
       <p:sp>
         <p:nvSpPr>
           <p:cNvPr id="54" name="Diamond 53"/>
@@ -5433,15 +5305,15 @@
         <p:nvCxnSpPr>
           <p:cNvPr id="77" name="Elbow Connector 76"/>
           <p:cNvCxnSpPr>
-            <a:stCxn id="106" idx="0"/>
+            <a:stCxn id="52" idx="1"/>
             <a:endCxn id="96" idx="1"/>
           </p:cNvCxnSpPr>
           <p:nvPr/>
         </p:nvCxnSpPr>
         <p:spPr>
           <a:xfrm rot="5400000" flipH="1" flipV="1">
-            <a:off x="5549722" y="985380"/>
-            <a:ext cx="411241" cy="1185584"/>
+            <a:off x="5631348" y="903754"/>
+            <a:ext cx="247989" cy="1185584"/>
           </a:xfrm>
           <a:prstGeom prst="bentConnector2">
             <a:avLst/>
@@ -5739,7 +5611,7 @@
         </p:nvSpPr>
         <p:spPr>
           <a:xfrm>
-            <a:off x="5219836" y="2177769"/>
+            <a:off x="5219836" y="2237943"/>
             <a:ext cx="170709" cy="200457"/>
           </a:xfrm>
           <a:prstGeom prst="rect">
@@ -5780,8 +5652,8 @@
         </p:nvCxnSpPr>
         <p:spPr>
           <a:xfrm rot="10800000">
-            <a:off x="5162550" y="2145562"/>
-            <a:ext cx="1125864" cy="374072"/>
+            <a:off x="5162550" y="2190570"/>
+            <a:ext cx="1125864" cy="329064"/>
           </a:xfrm>
           <a:prstGeom prst="bentConnector2">
             <a:avLst/>
@@ -5898,6 +5770,174 @@
                 </a:schemeClr>
               </a:solidFill>
             </a:endParaRPr>
+          </a:p>
+        </p:txBody>
+      </p:sp>
+      <p:sp>
+        <p:nvSpPr>
+          <p:cNvPr id="116" name="Rectangle 115"/>
+          <p:cNvSpPr/>
+          <p:nvPr/>
+        </p:nvSpPr>
+        <p:spPr>
+          <a:xfrm>
+            <a:off x="4922925" y="3643941"/>
+            <a:ext cx="1124417" cy="457200"/>
+          </a:xfrm>
+          <a:prstGeom prst="rect">
+            <a:avLst/>
+          </a:prstGeom>
+        </p:spPr>
+        <p:style>
+          <a:lnRef idx="2">
+            <a:schemeClr val="accent4">
+              <a:shade val="50000"/>
+            </a:schemeClr>
+          </a:lnRef>
+          <a:fillRef idx="1">
+            <a:schemeClr val="accent4"/>
+          </a:fillRef>
+          <a:effectRef idx="0">
+            <a:schemeClr val="accent4"/>
+          </a:effectRef>
+          <a:fontRef idx="minor">
+            <a:schemeClr val="lt1"/>
+          </a:fontRef>
+        </p:style>
+        <p:txBody>
+          <a:bodyPr rtlCol="0" anchor="ctr"/>
+          <a:lstStyle/>
+          <a:p>
+            <a:pPr algn="ctr"/>
+            <a:r>
+              <a:rPr lang="en-US" sz="1600" b="1" dirty="0" err="1" smtClean="0"/>
+              <a:t>CoursesDb</a:t>
+            </a:r>
+            <a:endParaRPr lang="en-SG" sz="1600" b="1" dirty="0"/>
+          </a:p>
+        </p:txBody>
+      </p:sp>
+      <p:sp>
+        <p:nvSpPr>
+          <p:cNvPr id="106" name="Rectangle 105"/>
+          <p:cNvSpPr/>
+          <p:nvPr/>
+        </p:nvSpPr>
+        <p:spPr>
+          <a:xfrm>
+            <a:off x="4723933" y="1828800"/>
+            <a:ext cx="877233" cy="361770"/>
+          </a:xfrm>
+          <a:prstGeom prst="rect">
+            <a:avLst/>
+          </a:prstGeom>
+        </p:spPr>
+        <p:style>
+          <a:lnRef idx="2">
+            <a:schemeClr val="accent4">
+              <a:shade val="50000"/>
+            </a:schemeClr>
+          </a:lnRef>
+          <a:fillRef idx="1">
+            <a:schemeClr val="accent4"/>
+          </a:fillRef>
+          <a:effectRef idx="0">
+            <a:schemeClr val="accent4"/>
+          </a:effectRef>
+          <a:fontRef idx="minor">
+            <a:schemeClr val="lt1"/>
+          </a:fontRef>
+        </p:style>
+        <p:txBody>
+          <a:bodyPr rtlCol="0" anchor="ctr"/>
+          <a:lstStyle/>
+          <a:p>
+            <a:pPr algn="ctr"/>
+            <a:r>
+              <a:rPr lang="en-US" sz="1600" b="1" dirty="0" smtClean="0"/>
+              <a:t>Course</a:t>
+            </a:r>
+            <a:endParaRPr lang="en-SG" sz="1600" b="1" dirty="0"/>
+          </a:p>
+        </p:txBody>
+      </p:sp>
+      <p:sp>
+        <p:nvSpPr>
+          <p:cNvPr id="27" name="Diamond 26"/>
+          <p:cNvSpPr/>
+          <p:nvPr/>
+        </p:nvSpPr>
+        <p:spPr>
+          <a:xfrm>
+            <a:off x="4516140" y="1891341"/>
+            <a:ext cx="208260" cy="151078"/>
+          </a:xfrm>
+          <a:prstGeom prst="diamond">
+            <a:avLst/>
+          </a:prstGeom>
+        </p:spPr>
+        <p:style>
+          <a:lnRef idx="2">
+            <a:schemeClr val="accent4">
+              <a:shade val="50000"/>
+            </a:schemeClr>
+          </a:lnRef>
+          <a:fillRef idx="1">
+            <a:schemeClr val="accent4"/>
+          </a:fillRef>
+          <a:effectRef idx="0">
+            <a:schemeClr val="accent4"/>
+          </a:effectRef>
+          <a:fontRef idx="minor">
+            <a:schemeClr val="lt1"/>
+          </a:fontRef>
+        </p:style>
+        <p:txBody>
+          <a:bodyPr rtlCol="0" anchor="ctr"/>
+          <a:lstStyle/>
+          <a:p>
+            <a:pPr algn="ctr"/>
+            <a:endParaRPr lang="en-SG" sz="1600" b="1"/>
+          </a:p>
+        </p:txBody>
+      </p:sp>
+      <p:sp>
+        <p:nvSpPr>
+          <p:cNvPr id="52" name="Diamond 51"/>
+          <p:cNvSpPr/>
+          <p:nvPr/>
+        </p:nvSpPr>
+        <p:spPr>
+          <a:xfrm rot="5400000">
+            <a:off x="5058420" y="1649131"/>
+            <a:ext cx="208260" cy="151078"/>
+          </a:xfrm>
+          <a:prstGeom prst="diamond">
+            <a:avLst/>
+          </a:prstGeom>
+        </p:spPr>
+        <p:style>
+          <a:lnRef idx="2">
+            <a:schemeClr val="accent4">
+              <a:shade val="50000"/>
+            </a:schemeClr>
+          </a:lnRef>
+          <a:fillRef idx="1">
+            <a:schemeClr val="accent4"/>
+          </a:fillRef>
+          <a:effectRef idx="0">
+            <a:schemeClr val="accent4"/>
+          </a:effectRef>
+          <a:fontRef idx="minor">
+            <a:schemeClr val="lt1"/>
+          </a:fontRef>
+        </p:style>
+        <p:txBody>
+          <a:bodyPr rtlCol="0" anchor="ctr"/>
+          <a:lstStyle/>
+          <a:p>
+            <a:pPr algn="ctr"/>
+            <a:endParaRPr lang="en-SG" sz="1600" b="1"/>
           </a:p>
         </p:txBody>
       </p:sp>

</xml_diff>

<commit_message>
Issue 491 [Update storage entity diagram to include multiple instructors per course] Update Issue 491 changed 2 diagrams
</commit_message>
<xml_diff>
--- a/doc/diagrams/StorageComponent.pptx
+++ b/doc/diagrams/StorageComponent.pptx
@@ -193,7 +193,7 @@
             <a:fld id="{AF301891-4E62-472A-98E9-95DBD40531A4}" type="datetimeFigureOut">
               <a:rPr lang="en-SG" smtClean="0"/>
               <a:pPr/>
-              <a:t>5/12/2012</a:t>
+              <a:t>15/1/2013</a:t>
             </a:fld>
             <a:endParaRPr lang="en-SG"/>
           </a:p>
@@ -729,7 +729,7 @@
             <a:fld id="{1D8BD707-D9CF-40AE-B4C6-C98DA3205C09}" type="datetimeFigureOut">
               <a:rPr lang="en-US" smtClean="0"/>
               <a:pPr/>
-              <a:t>12/5/2012</a:t>
+              <a:t>1/15/2013</a:t>
             </a:fld>
             <a:endParaRPr lang="en-US"/>
           </a:p>
@@ -896,7 +896,7 @@
             <a:fld id="{1D8BD707-D9CF-40AE-B4C6-C98DA3205C09}" type="datetimeFigureOut">
               <a:rPr lang="en-US" smtClean="0"/>
               <a:pPr/>
-              <a:t>12/5/2012</a:t>
+              <a:t>1/15/2013</a:t>
             </a:fld>
             <a:endParaRPr lang="en-US"/>
           </a:p>
@@ -1073,7 +1073,7 @@
             <a:fld id="{1D8BD707-D9CF-40AE-B4C6-C98DA3205C09}" type="datetimeFigureOut">
               <a:rPr lang="en-US" smtClean="0"/>
               <a:pPr/>
-              <a:t>12/5/2012</a:t>
+              <a:t>1/15/2013</a:t>
             </a:fld>
             <a:endParaRPr lang="en-US"/>
           </a:p>
@@ -1240,7 +1240,7 @@
             <a:fld id="{1D8BD707-D9CF-40AE-B4C6-C98DA3205C09}" type="datetimeFigureOut">
               <a:rPr lang="en-US" smtClean="0"/>
               <a:pPr/>
-              <a:t>12/5/2012</a:t>
+              <a:t>1/15/2013</a:t>
             </a:fld>
             <a:endParaRPr lang="en-US"/>
           </a:p>
@@ -1483,7 +1483,7 @@
             <a:fld id="{1D8BD707-D9CF-40AE-B4C6-C98DA3205C09}" type="datetimeFigureOut">
               <a:rPr lang="en-US" smtClean="0"/>
               <a:pPr/>
-              <a:t>12/5/2012</a:t>
+              <a:t>1/15/2013</a:t>
             </a:fld>
             <a:endParaRPr lang="en-US"/>
           </a:p>
@@ -1768,7 +1768,7 @@
             <a:fld id="{1D8BD707-D9CF-40AE-B4C6-C98DA3205C09}" type="datetimeFigureOut">
               <a:rPr lang="en-US" smtClean="0"/>
               <a:pPr/>
-              <a:t>12/5/2012</a:t>
+              <a:t>1/15/2013</a:t>
             </a:fld>
             <a:endParaRPr lang="en-US"/>
           </a:p>
@@ -2187,7 +2187,7 @@
             <a:fld id="{1D8BD707-D9CF-40AE-B4C6-C98DA3205C09}" type="datetimeFigureOut">
               <a:rPr lang="en-US" smtClean="0"/>
               <a:pPr/>
-              <a:t>12/5/2012</a:t>
+              <a:t>1/15/2013</a:t>
             </a:fld>
             <a:endParaRPr lang="en-US"/>
           </a:p>
@@ -2302,7 +2302,7 @@
             <a:fld id="{1D8BD707-D9CF-40AE-B4C6-C98DA3205C09}" type="datetimeFigureOut">
               <a:rPr lang="en-US" smtClean="0"/>
               <a:pPr/>
-              <a:t>12/5/2012</a:t>
+              <a:t>1/15/2013</a:t>
             </a:fld>
             <a:endParaRPr lang="en-US"/>
           </a:p>
@@ -2394,7 +2394,7 @@
             <a:fld id="{1D8BD707-D9CF-40AE-B4C6-C98DA3205C09}" type="datetimeFigureOut">
               <a:rPr lang="en-US" smtClean="0"/>
               <a:pPr/>
-              <a:t>12/5/2012</a:t>
+              <a:t>1/15/2013</a:t>
             </a:fld>
             <a:endParaRPr lang="en-US"/>
           </a:p>
@@ -2668,7 +2668,7 @@
             <a:fld id="{1D8BD707-D9CF-40AE-B4C6-C98DA3205C09}" type="datetimeFigureOut">
               <a:rPr lang="en-US" smtClean="0"/>
               <a:pPr/>
-              <a:t>12/5/2012</a:t>
+              <a:t>1/15/2013</a:t>
             </a:fld>
             <a:endParaRPr lang="en-US"/>
           </a:p>
@@ -2918,7 +2918,7 @@
             <a:fld id="{1D8BD707-D9CF-40AE-B4C6-C98DA3205C09}" type="datetimeFigureOut">
               <a:rPr lang="en-US" smtClean="0"/>
               <a:pPr/>
-              <a:t>12/5/2012</a:t>
+              <a:t>1/15/2013</a:t>
             </a:fld>
             <a:endParaRPr lang="en-US"/>
           </a:p>
@@ -3128,7 +3128,7 @@
             <a:fld id="{1D8BD707-D9CF-40AE-B4C6-C98DA3205C09}" type="datetimeFigureOut">
               <a:rPr lang="en-US" smtClean="0"/>
               <a:pPr/>
-              <a:t>12/5/2012</a:t>
+              <a:t>1/15/2013</a:t>
             </a:fld>
             <a:endParaRPr lang="en-US"/>
           </a:p>
@@ -4079,7 +4079,7 @@
         <p:spPr>
           <a:xfrm>
             <a:off x="6172200" y="3643941"/>
-            <a:ext cx="1447800" cy="457200"/>
+            <a:ext cx="1981200" cy="457200"/>
           </a:xfrm>
           <a:prstGeom prst="rect">
             <a:avLst/>
@@ -5214,53 +5214,10 @@
           </a:fontRef>
         </p:style>
       </p:cxnSp>
-      <p:sp>
-        <p:nvSpPr>
-          <p:cNvPr id="72" name="Rectangle 71"/>
-          <p:cNvSpPr/>
-          <p:nvPr/>
-        </p:nvSpPr>
-        <p:spPr>
-          <a:xfrm>
-            <a:off x="7314267" y="1752239"/>
-            <a:ext cx="991533" cy="361770"/>
-          </a:xfrm>
-          <a:prstGeom prst="rect">
-            <a:avLst/>
-          </a:prstGeom>
-        </p:spPr>
-        <p:style>
-          <a:lnRef idx="2">
-            <a:schemeClr val="accent3"/>
-          </a:lnRef>
-          <a:fillRef idx="1">
-            <a:schemeClr val="lt1"/>
-          </a:fillRef>
-          <a:effectRef idx="0">
-            <a:schemeClr val="accent3"/>
-          </a:effectRef>
-          <a:fontRef idx="minor">
-            <a:schemeClr val="dk1"/>
-          </a:fontRef>
-        </p:style>
-        <p:txBody>
-          <a:bodyPr rtlCol="0" anchor="ctr"/>
-          <a:lstStyle/>
-          <a:p>
-            <a:pPr algn="ctr"/>
-            <a:r>
-              <a:rPr lang="en-US" sz="1600" b="1" dirty="0" err="1" smtClean="0"/>
-              <a:t>GoogleId</a:t>
-            </a:r>
-            <a:endParaRPr lang="en-SG" sz="1600" b="1" dirty="0"/>
-          </a:p>
-        </p:txBody>
-      </p:sp>
       <p:cxnSp>
         <p:nvCxnSpPr>
           <p:cNvPr id="73" name="Elbow Connector 72"/>
           <p:cNvCxnSpPr>
-            <a:stCxn id="72" idx="0"/>
             <a:endCxn id="96" idx="3"/>
           </p:cNvCxnSpPr>
           <p:nvPr/>
@@ -5391,7 +5348,7 @@
             <a:pPr algn="ctr"/>
             <a:r>
               <a:rPr lang="en-US" sz="1600" b="1" dirty="0" smtClean="0"/>
-              <a:t>Coordinator</a:t>
+              <a:t>Instructor</a:t>
             </a:r>
             <a:endParaRPr lang="en-SG" sz="1600" b="1" dirty="0"/>
           </a:p>
@@ -5400,15 +5357,13 @@
       <p:cxnSp>
         <p:nvCxnSpPr>
           <p:cNvPr id="124" name="Straight Arrow Connector 123"/>
-          <p:cNvCxnSpPr>
-            <a:stCxn id="97" idx="2"/>
-          </p:cNvCxnSpPr>
+          <p:cNvCxnSpPr/>
           <p:nvPr/>
         </p:nvCxnSpPr>
         <p:spPr>
           <a:xfrm flipH="1">
-            <a:off x="6886207" y="2700519"/>
-            <a:ext cx="4619" cy="943422"/>
+            <a:off x="7997336" y="2114009"/>
+            <a:ext cx="4621" cy="1529932"/>
           </a:xfrm>
           <a:prstGeom prst="straightConnector1">
             <a:avLst/>
@@ -5440,7 +5395,6 @@
         <p:nvCxnSpPr>
           <p:cNvPr id="74" name="Elbow Connector 73"/>
           <p:cNvCxnSpPr>
-            <a:stCxn id="72" idx="2"/>
             <a:endCxn id="97" idx="3"/>
           </p:cNvCxnSpPr>
           <p:nvPr/>
@@ -5561,112 +5515,30 @@
           </a:p>
         </p:txBody>
       </p:sp>
-      <p:sp>
-        <p:nvSpPr>
-          <p:cNvPr id="88" name="TextBox 87"/>
-          <p:cNvSpPr txBox="1"/>
-          <p:nvPr/>
-        </p:nvSpPr>
-        <p:spPr>
-          <a:xfrm>
-            <a:off x="6115559" y="2232368"/>
-            <a:ext cx="170709" cy="200457"/>
-          </a:xfrm>
-          <a:prstGeom prst="rect">
-            <a:avLst/>
-          </a:prstGeom>
-          <a:noFill/>
-        </p:spPr>
-        <p:txBody>
-          <a:bodyPr wrap="square" lIns="0" tIns="0" rIns="0" bIns="0" rtlCol="0" anchor="ctr" anchorCtr="0">
-            <a:noAutofit/>
-          </a:bodyPr>
-          <a:lstStyle/>
-          <a:p>
-            <a:r>
-              <a:rPr lang="en-US" sz="1600" dirty="0" smtClean="0">
-                <a:solidFill>
-                  <a:schemeClr val="accent6">
-                    <a:lumMod val="75000"/>
-                  </a:schemeClr>
-                </a:solidFill>
-              </a:rPr>
-              <a:t>1</a:t>
-            </a:r>
-            <a:endParaRPr lang="en-SG" sz="1600" dirty="0">
-              <a:solidFill>
-                <a:schemeClr val="accent6">
-                  <a:lumMod val="75000"/>
-                </a:schemeClr>
-              </a:solidFill>
-            </a:endParaRPr>
-          </a:p>
-        </p:txBody>
-      </p:sp>
-      <p:sp>
-        <p:nvSpPr>
-          <p:cNvPr id="89" name="TextBox 88"/>
-          <p:cNvSpPr txBox="1"/>
-          <p:nvPr/>
-        </p:nvSpPr>
-        <p:spPr>
-          <a:xfrm>
-            <a:off x="5219836" y="2237943"/>
-            <a:ext cx="170709" cy="200457"/>
-          </a:xfrm>
-          <a:prstGeom prst="rect">
-            <a:avLst/>
-          </a:prstGeom>
-          <a:noFill/>
-        </p:spPr>
-        <p:txBody>
-          <a:bodyPr wrap="square" lIns="0" tIns="0" rIns="0" bIns="0" rtlCol="0" anchor="ctr" anchorCtr="0">
-            <a:noAutofit/>
-          </a:bodyPr>
-          <a:lstStyle/>
-          <a:p>
-            <a:r>
-              <a:rPr lang="en-US" b="1" dirty="0" smtClean="0">
-                <a:solidFill>
-                  <a:schemeClr val="accent4"/>
-                </a:solidFill>
-              </a:rPr>
-              <a:t>*</a:t>
-            </a:r>
-            <a:endParaRPr lang="en-SG" b="1" dirty="0">
-              <a:solidFill>
-                <a:schemeClr val="accent4"/>
-              </a:solidFill>
-            </a:endParaRPr>
-          </a:p>
-        </p:txBody>
-      </p:sp>
       <p:cxnSp>
         <p:nvCxnSpPr>
-          <p:cNvPr id="80" name="Elbow Connector 79"/>
-          <p:cNvCxnSpPr>
-            <a:stCxn id="97" idx="1"/>
-            <a:endCxn id="106" idx="2"/>
-          </p:cNvCxnSpPr>
+          <p:cNvPr id="60" name="Straight Arrow Connector 59"/>
+          <p:cNvCxnSpPr/>
           <p:nvPr/>
         </p:nvCxnSpPr>
         <p:spPr>
-          <a:xfrm rot="10800000">
-            <a:off x="5162550" y="2190570"/>
-            <a:ext cx="1125864" cy="329064"/>
-          </a:xfrm>
-          <a:prstGeom prst="bentConnector2">
+          <a:xfrm>
+            <a:off x="7263774" y="6339393"/>
+            <a:ext cx="1339498" cy="0"/>
+          </a:xfrm>
+          <a:prstGeom prst="straightConnector1">
             <a:avLst/>
           </a:prstGeom>
           <a:ln w="57150" cmpd="dbl">
             <a:solidFill>
-              <a:schemeClr val="accent6">
+              <a:schemeClr val="tx1">
                 <a:lumMod val="50000"/>
+                <a:lumOff val="50000"/>
               </a:schemeClr>
             </a:solidFill>
             <a:prstDash val="solid"/>
-            <a:headEnd type="triangle" w="med" len="med"/>
-            <a:tailEnd type="none" w="med" len="med"/>
+            <a:headEnd type="none" w="med" len="med"/>
+            <a:tailEnd type="triangle" w="med" len="med"/>
           </a:ln>
         </p:spPr>
         <p:style>
@@ -5686,30 +5558,243 @@
           </a:fontRef>
         </p:style>
       </p:cxnSp>
+      <p:sp>
+        <p:nvSpPr>
+          <p:cNvPr id="102" name="TextBox 101"/>
+          <p:cNvSpPr txBox="1"/>
+          <p:nvPr/>
+        </p:nvSpPr>
+        <p:spPr>
+          <a:xfrm>
+            <a:off x="7162800" y="6505143"/>
+            <a:ext cx="1669072" cy="200457"/>
+          </a:xfrm>
+          <a:prstGeom prst="rect">
+            <a:avLst/>
+          </a:prstGeom>
+          <a:noFill/>
+        </p:spPr>
+        <p:txBody>
+          <a:bodyPr wrap="square" lIns="0" tIns="0" rIns="0" bIns="0" rtlCol="0" anchor="ctr" anchorCtr="0">
+            <a:noAutofit/>
+          </a:bodyPr>
+          <a:lstStyle/>
+          <a:p>
+            <a:r>
+              <a:rPr lang="en-US" sz="1400" b="1" dirty="0" smtClean="0">
+                <a:solidFill>
+                  <a:schemeClr val="tx1">
+                    <a:lumMod val="50000"/>
+                    <a:lumOff val="50000"/>
+                  </a:schemeClr>
+                </a:solidFill>
+              </a:rPr>
+              <a:t>Associations managed using string references</a:t>
+            </a:r>
+            <a:endParaRPr lang="en-SG" sz="1400" b="1" dirty="0">
+              <a:solidFill>
+                <a:schemeClr val="tx1">
+                  <a:lumMod val="50000"/>
+                  <a:lumOff val="50000"/>
+                </a:schemeClr>
+              </a:solidFill>
+            </a:endParaRPr>
+          </a:p>
+        </p:txBody>
+      </p:sp>
+      <p:sp>
+        <p:nvSpPr>
+          <p:cNvPr id="116" name="Rectangle 115"/>
+          <p:cNvSpPr/>
+          <p:nvPr/>
+        </p:nvSpPr>
+        <p:spPr>
+          <a:xfrm>
+            <a:off x="4922925" y="3643941"/>
+            <a:ext cx="1124417" cy="457200"/>
+          </a:xfrm>
+          <a:prstGeom prst="rect">
+            <a:avLst/>
+          </a:prstGeom>
+        </p:spPr>
+        <p:style>
+          <a:lnRef idx="2">
+            <a:schemeClr val="accent4">
+              <a:shade val="50000"/>
+            </a:schemeClr>
+          </a:lnRef>
+          <a:fillRef idx="1">
+            <a:schemeClr val="accent4"/>
+          </a:fillRef>
+          <a:effectRef idx="0">
+            <a:schemeClr val="accent4"/>
+          </a:effectRef>
+          <a:fontRef idx="minor">
+            <a:schemeClr val="lt1"/>
+          </a:fontRef>
+        </p:style>
+        <p:txBody>
+          <a:bodyPr rtlCol="0" anchor="ctr"/>
+          <a:lstStyle/>
+          <a:p>
+            <a:pPr algn="ctr"/>
+            <a:r>
+              <a:rPr lang="en-US" sz="1600" b="1" dirty="0" err="1" smtClean="0"/>
+              <a:t>CoursesDb</a:t>
+            </a:r>
+            <a:endParaRPr lang="en-SG" sz="1600" b="1" dirty="0"/>
+          </a:p>
+        </p:txBody>
+      </p:sp>
+      <p:sp>
+        <p:nvSpPr>
+          <p:cNvPr id="106" name="Rectangle 105"/>
+          <p:cNvSpPr/>
+          <p:nvPr/>
+        </p:nvSpPr>
+        <p:spPr>
+          <a:xfrm>
+            <a:off x="4723933" y="1828800"/>
+            <a:ext cx="877233" cy="361770"/>
+          </a:xfrm>
+          <a:prstGeom prst="rect">
+            <a:avLst/>
+          </a:prstGeom>
+        </p:spPr>
+        <p:style>
+          <a:lnRef idx="2">
+            <a:schemeClr val="accent4">
+              <a:shade val="50000"/>
+            </a:schemeClr>
+          </a:lnRef>
+          <a:fillRef idx="1">
+            <a:schemeClr val="accent4"/>
+          </a:fillRef>
+          <a:effectRef idx="0">
+            <a:schemeClr val="accent4"/>
+          </a:effectRef>
+          <a:fontRef idx="minor">
+            <a:schemeClr val="lt1"/>
+          </a:fontRef>
+        </p:style>
+        <p:txBody>
+          <a:bodyPr rtlCol="0" anchor="ctr"/>
+          <a:lstStyle/>
+          <a:p>
+            <a:pPr algn="ctr"/>
+            <a:r>
+              <a:rPr lang="en-US" sz="1600" b="1" dirty="0" smtClean="0"/>
+              <a:t>Course</a:t>
+            </a:r>
+            <a:endParaRPr lang="en-SG" sz="1600" b="1" dirty="0"/>
+          </a:p>
+        </p:txBody>
+      </p:sp>
+      <p:sp>
+        <p:nvSpPr>
+          <p:cNvPr id="27" name="Diamond 26"/>
+          <p:cNvSpPr/>
+          <p:nvPr/>
+        </p:nvSpPr>
+        <p:spPr>
+          <a:xfrm>
+            <a:off x="4516140" y="1891341"/>
+            <a:ext cx="208260" cy="151078"/>
+          </a:xfrm>
+          <a:prstGeom prst="diamond">
+            <a:avLst/>
+          </a:prstGeom>
+        </p:spPr>
+        <p:style>
+          <a:lnRef idx="2">
+            <a:schemeClr val="accent4">
+              <a:shade val="50000"/>
+            </a:schemeClr>
+          </a:lnRef>
+          <a:fillRef idx="1">
+            <a:schemeClr val="accent4"/>
+          </a:fillRef>
+          <a:effectRef idx="0">
+            <a:schemeClr val="accent4"/>
+          </a:effectRef>
+          <a:fontRef idx="minor">
+            <a:schemeClr val="lt1"/>
+          </a:fontRef>
+        </p:style>
+        <p:txBody>
+          <a:bodyPr rtlCol="0" anchor="ctr"/>
+          <a:lstStyle/>
+          <a:p>
+            <a:pPr algn="ctr"/>
+            <a:endParaRPr lang="en-SG" sz="1600" b="1"/>
+          </a:p>
+        </p:txBody>
+      </p:sp>
+      <p:sp>
+        <p:nvSpPr>
+          <p:cNvPr id="52" name="Diamond 51"/>
+          <p:cNvSpPr/>
+          <p:nvPr/>
+        </p:nvSpPr>
+        <p:spPr>
+          <a:xfrm rot="5400000">
+            <a:off x="5058420" y="1649131"/>
+            <a:ext cx="208260" cy="151078"/>
+          </a:xfrm>
+          <a:prstGeom prst="diamond">
+            <a:avLst/>
+          </a:prstGeom>
+        </p:spPr>
+        <p:style>
+          <a:lnRef idx="2">
+            <a:schemeClr val="accent4">
+              <a:shade val="50000"/>
+            </a:schemeClr>
+          </a:lnRef>
+          <a:fillRef idx="1">
+            <a:schemeClr val="accent4"/>
+          </a:fillRef>
+          <a:effectRef idx="0">
+            <a:schemeClr val="accent4"/>
+          </a:effectRef>
+          <a:fontRef idx="minor">
+            <a:schemeClr val="lt1"/>
+          </a:fontRef>
+        </p:style>
+        <p:txBody>
+          <a:bodyPr rtlCol="0" anchor="ctr"/>
+          <a:lstStyle/>
+          <a:p>
+            <a:pPr algn="ctr"/>
+            <a:endParaRPr lang="en-SG" sz="1600" b="1"/>
+          </a:p>
+        </p:txBody>
+      </p:sp>
       <p:cxnSp>
         <p:nvCxnSpPr>
-          <p:cNvPr id="60" name="Straight Arrow Connector 59"/>
+          <p:cNvPr id="58" name="Elbow Connector 57"/>
           <p:cNvCxnSpPr/>
           <p:nvPr/>
         </p:nvCxnSpPr>
         <p:spPr>
           <a:xfrm>
-            <a:off x="7263774" y="6339393"/>
-            <a:ext cx="1339498" cy="0"/>
-          </a:xfrm>
-          <a:prstGeom prst="straightConnector1">
-            <a:avLst/>
+            <a:off x="5390489" y="2338749"/>
+            <a:ext cx="897925" cy="280654"/>
+          </a:xfrm>
+          <a:prstGeom prst="bentConnector3">
+            <a:avLst>
+              <a:gd name="adj1" fmla="val -210"/>
+            </a:avLst>
           </a:prstGeom>
           <a:ln w="57150" cmpd="dbl">
             <a:solidFill>
-              <a:schemeClr val="tx1">
+              <a:schemeClr val="accent6">
                 <a:lumMod val="50000"/>
-                <a:lumOff val="50000"/>
               </a:schemeClr>
             </a:solidFill>
             <a:prstDash val="solid"/>
-            <a:headEnd type="none" w="med" len="med"/>
-            <a:tailEnd type="triangle" w="med" len="med"/>
+            <a:headEnd type="triangle" w="med" len="med"/>
+            <a:tailEnd type="none" w="med" len="med"/>
           </a:ln>
         </p:spPr>
         <p:style>
@@ -5731,60 +5816,97 @@
       </p:cxnSp>
       <p:sp>
         <p:nvSpPr>
-          <p:cNvPr id="102" name="TextBox 101"/>
-          <p:cNvSpPr txBox="1"/>
+          <p:cNvPr id="59" name="Rectangle 58"/>
+          <p:cNvSpPr/>
           <p:nvPr/>
         </p:nvSpPr>
         <p:spPr>
           <a:xfrm>
-            <a:off x="7162800" y="6505143"/>
-            <a:ext cx="1669072" cy="200457"/>
+            <a:off x="7203086" y="1752951"/>
+            <a:ext cx="1076146" cy="361770"/>
           </a:xfrm>
           <a:prstGeom prst="rect">
             <a:avLst/>
           </a:prstGeom>
-          <a:noFill/>
-        </p:spPr>
-        <p:txBody>
-          <a:bodyPr wrap="square" lIns="0" tIns="0" rIns="0" bIns="0" rtlCol="0" anchor="ctr" anchorCtr="0">
-            <a:noAutofit/>
-          </a:bodyPr>
-          <a:lstStyle/>
-          <a:p>
-            <a:r>
-              <a:rPr lang="en-US" sz="1400" b="1" dirty="0" smtClean="0">
-                <a:solidFill>
-                  <a:schemeClr val="tx1">
-                    <a:lumMod val="50000"/>
-                    <a:lumOff val="50000"/>
-                  </a:schemeClr>
-                </a:solidFill>
-              </a:rPr>
-              <a:t>Associations managed using string references</a:t>
-            </a:r>
-            <a:endParaRPr lang="en-SG" sz="1400" b="1" dirty="0">
-              <a:solidFill>
-                <a:schemeClr val="tx1">
-                  <a:lumMod val="50000"/>
-                  <a:lumOff val="50000"/>
-                </a:schemeClr>
-              </a:solidFill>
-            </a:endParaRPr>
-          </a:p>
-        </p:txBody>
-      </p:sp>
-      <p:sp>
-        <p:nvSpPr>
-          <p:cNvPr id="116" name="Rectangle 115"/>
+        </p:spPr>
+        <p:style>
+          <a:lnRef idx="2">
+            <a:schemeClr val="accent6">
+              <a:shade val="50000"/>
+            </a:schemeClr>
+          </a:lnRef>
+          <a:fillRef idx="1">
+            <a:schemeClr val="accent6"/>
+          </a:fillRef>
+          <a:effectRef idx="0">
+            <a:schemeClr val="accent6"/>
+          </a:effectRef>
+          <a:fontRef idx="minor">
+            <a:schemeClr val="lt1"/>
+          </a:fontRef>
+        </p:style>
+        <p:txBody>
+          <a:bodyPr rtlCol="0" anchor="ctr"/>
+          <a:lstStyle/>
+          <a:p>
+            <a:pPr algn="ctr"/>
+            <a:r>
+              <a:rPr lang="en-US" sz="1600" b="1" dirty="0" smtClean="0"/>
+              <a:t>Account</a:t>
+            </a:r>
+            <a:endParaRPr lang="en-SG" sz="1600" b="1" dirty="0"/>
+          </a:p>
+        </p:txBody>
+      </p:sp>
+      <p:cxnSp>
+        <p:nvCxnSpPr>
+          <p:cNvPr id="62" name="Straight Arrow Connector 61"/>
+          <p:cNvCxnSpPr/>
+          <p:nvPr/>
+        </p:nvCxnSpPr>
+        <p:spPr>
+          <a:xfrm flipH="1">
+            <a:off x="6886207" y="2700519"/>
+            <a:ext cx="4619" cy="943422"/>
+          </a:xfrm>
+          <a:prstGeom prst="straightConnector1">
+            <a:avLst/>
+          </a:prstGeom>
+          <a:ln>
+            <a:prstDash val="sysDot"/>
+            <a:headEnd type="arrow" w="med" len="med"/>
+            <a:tailEnd type="none" w="med" len="med"/>
+          </a:ln>
+        </p:spPr>
+        <p:style>
+          <a:lnRef idx="2">
+            <a:schemeClr val="accent6">
+              <a:shade val="50000"/>
+            </a:schemeClr>
+          </a:lnRef>
+          <a:fillRef idx="1">
+            <a:schemeClr val="accent6"/>
+          </a:fillRef>
+          <a:effectRef idx="0">
+            <a:schemeClr val="accent6"/>
+          </a:effectRef>
+          <a:fontRef idx="minor">
+            <a:schemeClr val="lt1"/>
+          </a:fontRef>
+        </p:style>
+      </p:cxnSp>
+      <p:sp>
+        <p:nvSpPr>
+          <p:cNvPr id="63" name="Diamond 62"/>
           <p:cNvSpPr/>
           <p:nvPr/>
         </p:nvSpPr>
         <p:spPr>
-          <a:xfrm>
-            <a:off x="4922925" y="3643941"/>
-            <a:ext cx="1124417" cy="457200"/>
-          </a:xfrm>
-          <a:prstGeom prst="rect">
+          <a:xfrm rot="5400000">
+            <a:off x="5337013" y="2190628"/>
+            <a:ext cx="126058" cy="170183"/>
+          </a:xfrm>
+          <a:prstGeom prst="diamond">
             <a:avLst/>
           </a:prstGeom>
         </p:spPr>
@@ -5809,135 +5931,129 @@
           <a:lstStyle/>
           <a:p>
             <a:pPr algn="ctr"/>
-            <a:r>
-              <a:rPr lang="en-US" sz="1600" b="1" dirty="0" err="1" smtClean="0"/>
-              <a:t>CoursesDb</a:t>
-            </a:r>
-            <a:endParaRPr lang="en-SG" sz="1600" b="1" dirty="0"/>
-          </a:p>
-        </p:txBody>
-      </p:sp>
-      <p:sp>
-        <p:nvSpPr>
-          <p:cNvPr id="106" name="Rectangle 105"/>
-          <p:cNvSpPr/>
+            <a:endParaRPr lang="en-SG" sz="1600" b="1"/>
+          </a:p>
+        </p:txBody>
+      </p:sp>
+      <p:sp>
+        <p:nvSpPr>
+          <p:cNvPr id="68" name="TextBox 67"/>
+          <p:cNvSpPr txBox="1"/>
           <p:nvPr/>
         </p:nvSpPr>
         <p:spPr>
           <a:xfrm>
-            <a:off x="4723933" y="1828800"/>
-            <a:ext cx="877233" cy="361770"/>
+            <a:off x="5515811" y="2369400"/>
+            <a:ext cx="170709" cy="200457"/>
           </a:xfrm>
           <a:prstGeom prst="rect">
             <a:avLst/>
           </a:prstGeom>
-        </p:spPr>
-        <p:style>
-          <a:lnRef idx="2">
-            <a:schemeClr val="accent4">
-              <a:shade val="50000"/>
-            </a:schemeClr>
-          </a:lnRef>
-          <a:fillRef idx="1">
-            <a:schemeClr val="accent4"/>
-          </a:fillRef>
-          <a:effectRef idx="0">
-            <a:schemeClr val="accent4"/>
-          </a:effectRef>
-          <a:fontRef idx="minor">
-            <a:schemeClr val="lt1"/>
-          </a:fontRef>
-        </p:style>
-        <p:txBody>
-          <a:bodyPr rtlCol="0" anchor="ctr"/>
-          <a:lstStyle/>
-          <a:p>
-            <a:pPr algn="ctr"/>
-            <a:r>
-              <a:rPr lang="en-US" sz="1600" b="1" dirty="0" smtClean="0"/>
-              <a:t>Course</a:t>
-            </a:r>
-            <a:endParaRPr lang="en-SG" sz="1600" b="1" dirty="0"/>
-          </a:p>
-        </p:txBody>
-      </p:sp>
-      <p:sp>
-        <p:nvSpPr>
-          <p:cNvPr id="27" name="Diamond 26"/>
-          <p:cNvSpPr/>
+          <a:noFill/>
+        </p:spPr>
+        <p:txBody>
+          <a:bodyPr wrap="square" lIns="0" tIns="0" rIns="0" bIns="0" rtlCol="0" anchor="ctr" anchorCtr="0">
+            <a:noAutofit/>
+          </a:bodyPr>
+          <a:lstStyle/>
+          <a:p>
+            <a:r>
+              <a:rPr lang="en-US" b="1" dirty="0" smtClean="0">
+                <a:solidFill>
+                  <a:schemeClr val="accent4"/>
+                </a:solidFill>
+              </a:rPr>
+              <a:t>*</a:t>
+            </a:r>
+            <a:endParaRPr lang="en-SG" b="1" dirty="0">
+              <a:solidFill>
+                <a:schemeClr val="accent4"/>
+              </a:solidFill>
+            </a:endParaRPr>
+          </a:p>
+        </p:txBody>
+      </p:sp>
+      <p:sp>
+        <p:nvSpPr>
+          <p:cNvPr id="75" name="TextBox 74"/>
+          <p:cNvSpPr txBox="1"/>
           <p:nvPr/>
         </p:nvSpPr>
         <p:spPr>
           <a:xfrm>
-            <a:off x="4516140" y="1891341"/>
-            <a:ext cx="208260" cy="151078"/>
-          </a:xfrm>
-          <a:prstGeom prst="diamond">
+            <a:off x="7924800" y="1477897"/>
+            <a:ext cx="170709" cy="200457"/>
+          </a:xfrm>
+          <a:prstGeom prst="rect">
             <a:avLst/>
           </a:prstGeom>
-        </p:spPr>
-        <p:style>
-          <a:lnRef idx="2">
-            <a:schemeClr val="accent4">
-              <a:shade val="50000"/>
-            </a:schemeClr>
-          </a:lnRef>
-          <a:fillRef idx="1">
-            <a:schemeClr val="accent4"/>
-          </a:fillRef>
-          <a:effectRef idx="0">
-            <a:schemeClr val="accent4"/>
-          </a:effectRef>
-          <a:fontRef idx="minor">
-            <a:schemeClr val="lt1"/>
-          </a:fontRef>
-        </p:style>
-        <p:txBody>
-          <a:bodyPr rtlCol="0" anchor="ctr"/>
-          <a:lstStyle/>
-          <a:p>
-            <a:pPr algn="ctr"/>
-            <a:endParaRPr lang="en-SG" sz="1600" b="1"/>
-          </a:p>
-        </p:txBody>
-      </p:sp>
-      <p:sp>
-        <p:nvSpPr>
-          <p:cNvPr id="52" name="Diamond 51"/>
-          <p:cNvSpPr/>
+          <a:noFill/>
+        </p:spPr>
+        <p:txBody>
+          <a:bodyPr wrap="square" lIns="0" tIns="0" rIns="0" bIns="0" rtlCol="0" anchor="ctr" anchorCtr="0">
+            <a:noAutofit/>
+          </a:bodyPr>
+          <a:lstStyle/>
+          <a:p>
+            <a:r>
+              <a:rPr lang="en-US" sz="1600" dirty="0">
+                <a:solidFill>
+                  <a:schemeClr val="accent6">
+                    <a:lumMod val="75000"/>
+                  </a:schemeClr>
+                </a:solidFill>
+              </a:rPr>
+              <a:t>1</a:t>
+            </a:r>
+            <a:endParaRPr lang="en-SG" sz="1600" dirty="0">
+              <a:solidFill>
+                <a:schemeClr val="accent6">
+                  <a:lumMod val="75000"/>
+                </a:schemeClr>
+              </a:solidFill>
+            </a:endParaRPr>
+          </a:p>
+        </p:txBody>
+      </p:sp>
+      <p:sp>
+        <p:nvSpPr>
+          <p:cNvPr id="76" name="TextBox 75"/>
+          <p:cNvSpPr txBox="1"/>
           <p:nvPr/>
         </p:nvSpPr>
         <p:spPr>
-          <a:xfrm rot="5400000">
-            <a:off x="5058420" y="1649131"/>
-            <a:ext cx="208260" cy="151078"/>
-          </a:xfrm>
-          <a:prstGeom prst="diamond">
+          <a:xfrm>
+            <a:off x="7610693" y="2138292"/>
+            <a:ext cx="170709" cy="200457"/>
+          </a:xfrm>
+          <a:prstGeom prst="rect">
             <a:avLst/>
           </a:prstGeom>
-        </p:spPr>
-        <p:style>
-          <a:lnRef idx="2">
-            <a:schemeClr val="accent4">
-              <a:shade val="50000"/>
-            </a:schemeClr>
-          </a:lnRef>
-          <a:fillRef idx="1">
-            <a:schemeClr val="accent4"/>
-          </a:fillRef>
-          <a:effectRef idx="0">
-            <a:schemeClr val="accent4"/>
-          </a:effectRef>
-          <a:fontRef idx="minor">
-            <a:schemeClr val="lt1"/>
-          </a:fontRef>
-        </p:style>
-        <p:txBody>
-          <a:bodyPr rtlCol="0" anchor="ctr"/>
-          <a:lstStyle/>
-          <a:p>
-            <a:pPr algn="ctr"/>
-            <a:endParaRPr lang="en-SG" sz="1600" b="1"/>
+          <a:noFill/>
+        </p:spPr>
+        <p:txBody>
+          <a:bodyPr wrap="square" lIns="0" tIns="0" rIns="0" bIns="0" rtlCol="0" anchor="ctr" anchorCtr="0">
+            <a:noAutofit/>
+          </a:bodyPr>
+          <a:lstStyle/>
+          <a:p>
+            <a:r>
+              <a:rPr lang="en-US" sz="1600" dirty="0">
+                <a:solidFill>
+                  <a:schemeClr val="accent6">
+                    <a:lumMod val="75000"/>
+                  </a:schemeClr>
+                </a:solidFill>
+              </a:rPr>
+              <a:t>1</a:t>
+            </a:r>
+            <a:endParaRPr lang="en-SG" sz="1600" dirty="0">
+              <a:solidFill>
+                <a:schemeClr val="accent6">
+                  <a:lumMod val="75000"/>
+                </a:schemeClr>
+              </a:solidFill>
+            </a:endParaRPr>
           </a:p>
         </p:txBody>
       </p:sp>

</xml_diff>